<commit_message>
Username validation system works!!!!!!!
</commit_message>
<xml_diff>
--- a/database.pptx
+++ b/database.pptx
@@ -5563,14 +5563,14 @@
           <p:nvPr>
             <p:extLst>
               <p:ext uri="{D42A27DB-BD31-4B8C-83A1-F6EECF244321}">
-                <p14:modId xmlns:p14="http://schemas.microsoft.com/office/powerpoint/2010/main" val="3810601594"/>
+                <p14:modId xmlns:p14="http://schemas.microsoft.com/office/powerpoint/2010/main" val="2250963437"/>
               </p:ext>
             </p:extLst>
           </p:nvPr>
         </p:nvGraphicFramePr>
         <p:xfrm>
-          <a:off x="2331571" y="863100"/>
-          <a:ext cx="5305608" cy="848052"/>
+          <a:off x="2331569" y="863100"/>
+          <a:ext cx="5647020" cy="848052"/>
         </p:xfrm>
         <a:graphic>
           <a:graphicData uri="http://schemas.openxmlformats.org/drawingml/2006/table">
@@ -5579,37 +5579,51 @@
                 <a:tableStyleId>{5C22544A-7EE6-4342-B048-85BDC9FD1C3A}</a:tableStyleId>
               </a:tblPr>
               <a:tblGrid>
-                <a:gridCol w="1326402">
+                <a:gridCol w="725396">
                   <a:extLst>
                     <a:ext uri="{9D8B030D-6E8A-4147-A177-3AD203B41FA5}">
                       <a16:colId xmlns:a16="http://schemas.microsoft.com/office/drawing/2014/main" val="1781345222"/>
                     </a:ext>
                   </a:extLst>
                 </a:gridCol>
-                <a:gridCol w="1326402">
+                <a:gridCol w="1290917">
                   <a:extLst>
                     <a:ext uri="{9D8B030D-6E8A-4147-A177-3AD203B41FA5}">
                       <a16:colId xmlns:a16="http://schemas.microsoft.com/office/drawing/2014/main" val="2428297054"/>
                     </a:ext>
                   </a:extLst>
                 </a:gridCol>
-                <a:gridCol w="1326402">
+                <a:gridCol w="1416424">
                   <a:extLst>
                     <a:ext uri="{9D8B030D-6E8A-4147-A177-3AD203B41FA5}">
                       <a16:colId xmlns:a16="http://schemas.microsoft.com/office/drawing/2014/main" val="98828105"/>
                     </a:ext>
                   </a:extLst>
                 </a:gridCol>
-                <a:gridCol w="1326402">
+                <a:gridCol w="815788">
                   <a:extLst>
                     <a:ext uri="{9D8B030D-6E8A-4147-A177-3AD203B41FA5}">
                       <a16:colId xmlns:a16="http://schemas.microsoft.com/office/drawing/2014/main" val="1652278398"/>
                     </a:ext>
                   </a:extLst>
                 </a:gridCol>
+                <a:gridCol w="708212">
+                  <a:extLst>
+                    <a:ext uri="{9D8B030D-6E8A-4147-A177-3AD203B41FA5}">
+                      <a16:colId xmlns:a16="http://schemas.microsoft.com/office/drawing/2014/main" val="3315888762"/>
+                    </a:ext>
+                  </a:extLst>
+                </a:gridCol>
+                <a:gridCol w="690283">
+                  <a:extLst>
+                    <a:ext uri="{9D8B030D-6E8A-4147-A177-3AD203B41FA5}">
+                      <a16:colId xmlns:a16="http://schemas.microsoft.com/office/drawing/2014/main" val="3204382854"/>
+                    </a:ext>
+                  </a:extLst>
+                </a:gridCol>
               </a:tblGrid>
               <a:tr h="281143">
-                <a:tc gridSpan="4">
+                <a:tc gridSpan="6">
                   <a:txBody>
                     <a:bodyPr/>
                     <a:lstStyle/>
@@ -5622,6 +5636,130 @@
                         </a:rPr>
                         <a:t>Post</a:t>
                       </a:r>
+                    </a:p>
+                  </a:txBody>
+                  <a:tcPr marL="69323" marR="69323" marT="34662" marB="34662">
+                    <a:lnL w="12700" cap="flat" cmpd="sng" algn="ctr">
+                      <a:solidFill>
+                        <a:schemeClr val="tx1"/>
+                      </a:solidFill>
+                      <a:prstDash val="solid"/>
+                      <a:round/>
+                      <a:headEnd type="none" w="med" len="med"/>
+                      <a:tailEnd type="none" w="med" len="med"/>
+                    </a:lnL>
+                    <a:lnR w="12700" cap="flat" cmpd="sng" algn="ctr">
+                      <a:solidFill>
+                        <a:schemeClr val="tx1"/>
+                      </a:solidFill>
+                      <a:prstDash val="solid"/>
+                      <a:round/>
+                      <a:headEnd type="none" w="med" len="med"/>
+                      <a:tailEnd type="none" w="med" len="med"/>
+                    </a:lnR>
+                    <a:lnT w="12700" cap="flat" cmpd="sng" algn="ctr">
+                      <a:solidFill>
+                        <a:schemeClr val="tx1"/>
+                      </a:solidFill>
+                      <a:prstDash val="solid"/>
+                      <a:round/>
+                      <a:headEnd type="none" w="med" len="med"/>
+                      <a:tailEnd type="none" w="med" len="med"/>
+                    </a:lnT>
+                    <a:lnB w="12700" cap="flat" cmpd="sng" algn="ctr">
+                      <a:solidFill>
+                        <a:schemeClr val="tx1"/>
+                      </a:solidFill>
+                      <a:prstDash val="solid"/>
+                      <a:round/>
+                      <a:headEnd type="none" w="med" len="med"/>
+                      <a:tailEnd type="none" w="med" len="med"/>
+                    </a:lnB>
+                    <a:lnTlToBr w="12700" cmpd="sng">
+                      <a:noFill/>
+                      <a:prstDash val="solid"/>
+                    </a:lnTlToBr>
+                    <a:lnBlToTr w="12700" cmpd="sng">
+                      <a:noFill/>
+                      <a:prstDash val="solid"/>
+                    </a:lnBlToTr>
+                    <a:solidFill>
+                      <a:schemeClr val="bg1"/>
+                    </a:solidFill>
+                  </a:tcPr>
+                </a:tc>
+                <a:tc hMerge="1">
+                  <a:txBody>
+                    <a:bodyPr/>
+                    <a:lstStyle/>
+                    <a:p>
+                      <a:endParaRPr lang="en-GB" sz="1400" dirty="0">
+                        <a:solidFill>
+                          <a:schemeClr val="tx1"/>
+                        </a:solidFill>
+                      </a:endParaRPr>
+                    </a:p>
+                  </a:txBody>
+                  <a:tcPr marL="69323" marR="69323" marT="34662" marB="34662">
+                    <a:lnL w="12700" cap="flat" cmpd="sng" algn="ctr">
+                      <a:solidFill>
+                        <a:schemeClr val="tx1"/>
+                      </a:solidFill>
+                      <a:prstDash val="solid"/>
+                      <a:round/>
+                      <a:headEnd type="none" w="med" len="med"/>
+                      <a:tailEnd type="none" w="med" len="med"/>
+                    </a:lnL>
+                    <a:lnR w="12700" cap="flat" cmpd="sng" algn="ctr">
+                      <a:solidFill>
+                        <a:schemeClr val="tx1"/>
+                      </a:solidFill>
+                      <a:prstDash val="solid"/>
+                      <a:round/>
+                      <a:headEnd type="none" w="med" len="med"/>
+                      <a:tailEnd type="none" w="med" len="med"/>
+                    </a:lnR>
+                    <a:lnT w="12700" cap="flat" cmpd="sng" algn="ctr">
+                      <a:solidFill>
+                        <a:schemeClr val="tx1"/>
+                      </a:solidFill>
+                      <a:prstDash val="solid"/>
+                      <a:round/>
+                      <a:headEnd type="none" w="med" len="med"/>
+                      <a:tailEnd type="none" w="med" len="med"/>
+                    </a:lnT>
+                    <a:lnB w="12700" cap="flat" cmpd="sng" algn="ctr">
+                      <a:solidFill>
+                        <a:schemeClr val="tx1"/>
+                      </a:solidFill>
+                      <a:prstDash val="solid"/>
+                      <a:round/>
+                      <a:headEnd type="none" w="med" len="med"/>
+                      <a:tailEnd type="none" w="med" len="med"/>
+                    </a:lnB>
+                    <a:lnTlToBr w="12700" cmpd="sng">
+                      <a:noFill/>
+                      <a:prstDash val="solid"/>
+                    </a:lnTlToBr>
+                    <a:lnBlToTr w="12700" cmpd="sng">
+                      <a:noFill/>
+                      <a:prstDash val="solid"/>
+                    </a:lnBlToTr>
+                    <a:solidFill>
+                      <a:schemeClr val="bg1"/>
+                    </a:solidFill>
+                  </a:tcPr>
+                </a:tc>
+                <a:tc hMerge="1">
+                  <a:txBody>
+                    <a:bodyPr/>
+                    <a:lstStyle/>
+                    <a:p>
+                      <a:endParaRPr lang="en-GB" sz="1400" dirty="0">
+                        <a:solidFill>
+                          <a:schemeClr val="tx1"/>
+                        </a:solidFill>
+                      </a:endParaRPr>
                     </a:p>
                   </a:txBody>
                   <a:tcPr marL="69323" marR="69323" marT="34662" marB="34662">
@@ -6127,13 +6265,6 @@
                     </a:solidFill>
                   </a:tcPr>
                 </a:tc>
-                <a:extLst>
-                  <a:ext uri="{0D108BD9-81ED-4DB2-BD59-A6C34878D82A}">
-                    <a16:rowId xmlns:a16="http://schemas.microsoft.com/office/drawing/2014/main" val="1315690800"/>
-                  </a:ext>
-                </a:extLst>
-              </a:tr>
-              <a:tr h="281143">
                 <a:tc>
                   <a:txBody>
                     <a:bodyPr/>
@@ -6145,458 +6276,7 @@
                             <a:schemeClr val="tx1"/>
                           </a:solidFill>
                         </a:rPr>
-                        <a:t>int</a:t>
-                      </a:r>
-                    </a:p>
-                  </a:txBody>
-                  <a:tcPr marL="69323" marR="69323" marT="34662" marB="34662">
-                    <a:lnL w="12700" cap="flat" cmpd="sng" algn="ctr">
-                      <a:solidFill>
-                        <a:schemeClr val="tx1"/>
-                      </a:solidFill>
-                      <a:prstDash val="solid"/>
-                      <a:round/>
-                      <a:headEnd type="none" w="med" len="med"/>
-                      <a:tailEnd type="none" w="med" len="med"/>
-                    </a:lnL>
-                    <a:lnR w="12700" cap="flat" cmpd="sng" algn="ctr">
-                      <a:solidFill>
-                        <a:schemeClr val="tx1"/>
-                      </a:solidFill>
-                      <a:prstDash val="solid"/>
-                      <a:round/>
-                      <a:headEnd type="none" w="med" len="med"/>
-                      <a:tailEnd type="none" w="med" len="med"/>
-                    </a:lnR>
-                    <a:lnT w="12700" cap="flat" cmpd="sng" algn="ctr">
-                      <a:solidFill>
-                        <a:schemeClr val="tx1"/>
-                      </a:solidFill>
-                      <a:prstDash val="solid"/>
-                      <a:round/>
-                      <a:headEnd type="none" w="med" len="med"/>
-                      <a:tailEnd type="none" w="med" len="med"/>
-                    </a:lnT>
-                    <a:lnB w="12700" cap="flat" cmpd="sng" algn="ctr">
-                      <a:solidFill>
-                        <a:schemeClr val="tx1"/>
-                      </a:solidFill>
-                      <a:prstDash val="solid"/>
-                      <a:round/>
-                      <a:headEnd type="none" w="med" len="med"/>
-                      <a:tailEnd type="none" w="med" len="med"/>
-                    </a:lnB>
-                    <a:lnTlToBr w="12700" cmpd="sng">
-                      <a:noFill/>
-                      <a:prstDash val="solid"/>
-                    </a:lnTlToBr>
-                    <a:lnBlToTr w="12700" cmpd="sng">
-                      <a:noFill/>
-                      <a:prstDash val="solid"/>
-                    </a:lnBlToTr>
-                    <a:solidFill>
-                      <a:schemeClr val="bg1"/>
-                    </a:solidFill>
-                  </a:tcPr>
-                </a:tc>
-                <a:tc>
-                  <a:txBody>
-                    <a:bodyPr/>
-                    <a:lstStyle/>
-                    <a:p>
-                      <a:r>
-                        <a:rPr lang="en-GB" sz="1400" dirty="0">
-                          <a:solidFill>
-                            <a:schemeClr val="tx1"/>
-                          </a:solidFill>
-                        </a:rPr>
-                        <a:t>15 char length</a:t>
-                      </a:r>
-                    </a:p>
-                  </a:txBody>
-                  <a:tcPr marL="69323" marR="69323" marT="34662" marB="34662">
-                    <a:lnL w="12700" cap="flat" cmpd="sng" algn="ctr">
-                      <a:solidFill>
-                        <a:schemeClr val="tx1"/>
-                      </a:solidFill>
-                      <a:prstDash val="solid"/>
-                      <a:round/>
-                      <a:headEnd type="none" w="med" len="med"/>
-                      <a:tailEnd type="none" w="med" len="med"/>
-                    </a:lnL>
-                    <a:lnR w="12700" cap="flat" cmpd="sng" algn="ctr">
-                      <a:solidFill>
-                        <a:schemeClr val="tx1"/>
-                      </a:solidFill>
-                      <a:prstDash val="solid"/>
-                      <a:round/>
-                      <a:headEnd type="none" w="med" len="med"/>
-                      <a:tailEnd type="none" w="med" len="med"/>
-                    </a:lnR>
-                    <a:lnT w="12700" cap="flat" cmpd="sng" algn="ctr">
-                      <a:solidFill>
-                        <a:schemeClr val="tx1"/>
-                      </a:solidFill>
-                      <a:prstDash val="solid"/>
-                      <a:round/>
-                      <a:headEnd type="none" w="med" len="med"/>
-                      <a:tailEnd type="none" w="med" len="med"/>
-                    </a:lnT>
-                    <a:lnB w="12700" cap="flat" cmpd="sng" algn="ctr">
-                      <a:solidFill>
-                        <a:schemeClr val="tx1"/>
-                      </a:solidFill>
-                      <a:prstDash val="solid"/>
-                      <a:round/>
-                      <a:headEnd type="none" w="med" len="med"/>
-                      <a:tailEnd type="none" w="med" len="med"/>
-                    </a:lnB>
-                    <a:lnTlToBr w="12700" cmpd="sng">
-                      <a:noFill/>
-                      <a:prstDash val="solid"/>
-                    </a:lnTlToBr>
-                    <a:lnBlToTr w="12700" cmpd="sng">
-                      <a:noFill/>
-                      <a:prstDash val="solid"/>
-                    </a:lnBlToTr>
-                    <a:solidFill>
-                      <a:schemeClr val="bg1"/>
-                    </a:solidFill>
-                  </a:tcPr>
-                </a:tc>
-                <a:tc>
-                  <a:txBody>
-                    <a:bodyPr/>
-                    <a:lstStyle/>
-                    <a:p>
-                      <a:r>
-                        <a:rPr lang="en-GB" sz="1400" dirty="0">
-                          <a:solidFill>
-                            <a:schemeClr val="tx1"/>
-                          </a:solidFill>
-                        </a:rPr>
-                        <a:t>400 char length</a:t>
-                      </a:r>
-                    </a:p>
-                  </a:txBody>
-                  <a:tcPr marL="69323" marR="69323" marT="34662" marB="34662">
-                    <a:lnL w="12700" cap="flat" cmpd="sng" algn="ctr">
-                      <a:solidFill>
-                        <a:schemeClr val="tx1"/>
-                      </a:solidFill>
-                      <a:prstDash val="solid"/>
-                      <a:round/>
-                      <a:headEnd type="none" w="med" len="med"/>
-                      <a:tailEnd type="none" w="med" len="med"/>
-                    </a:lnL>
-                    <a:lnR w="12700" cap="flat" cmpd="sng" algn="ctr">
-                      <a:solidFill>
-                        <a:schemeClr val="tx1"/>
-                      </a:solidFill>
-                      <a:prstDash val="solid"/>
-                      <a:round/>
-                      <a:headEnd type="none" w="med" len="med"/>
-                      <a:tailEnd type="none" w="med" len="med"/>
-                    </a:lnR>
-                    <a:lnT w="12700" cap="flat" cmpd="sng" algn="ctr">
-                      <a:solidFill>
-                        <a:schemeClr val="tx1"/>
-                      </a:solidFill>
-                      <a:prstDash val="solid"/>
-                      <a:round/>
-                      <a:headEnd type="none" w="med" len="med"/>
-                      <a:tailEnd type="none" w="med" len="med"/>
-                    </a:lnT>
-                    <a:lnB w="12700" cap="flat" cmpd="sng" algn="ctr">
-                      <a:solidFill>
-                        <a:schemeClr val="tx1"/>
-                      </a:solidFill>
-                      <a:prstDash val="solid"/>
-                      <a:round/>
-                      <a:headEnd type="none" w="med" len="med"/>
-                      <a:tailEnd type="none" w="med" len="med"/>
-                    </a:lnB>
-                    <a:lnTlToBr w="12700" cmpd="sng">
-                      <a:noFill/>
-                      <a:prstDash val="solid"/>
-                    </a:lnTlToBr>
-                    <a:lnBlToTr w="12700" cmpd="sng">
-                      <a:noFill/>
-                      <a:prstDash val="solid"/>
-                    </a:lnBlToTr>
-                    <a:solidFill>
-                      <a:schemeClr val="bg1"/>
-                    </a:solidFill>
-                  </a:tcPr>
-                </a:tc>
-                <a:tc>
-                  <a:txBody>
-                    <a:bodyPr/>
-                    <a:lstStyle/>
-                    <a:p>
-                      <a:r>
-                        <a:rPr lang="en-GB" sz="1400" dirty="0">
-                          <a:solidFill>
-                            <a:schemeClr val="tx1"/>
-                          </a:solidFill>
-                        </a:rPr>
-                        <a:t>int</a:t>
-                      </a:r>
-                    </a:p>
-                  </a:txBody>
-                  <a:tcPr marL="69323" marR="69323" marT="34662" marB="34662">
-                    <a:lnL w="12700" cap="flat" cmpd="sng" algn="ctr">
-                      <a:solidFill>
-                        <a:schemeClr val="tx1"/>
-                      </a:solidFill>
-                      <a:prstDash val="solid"/>
-                      <a:round/>
-                      <a:headEnd type="none" w="med" len="med"/>
-                      <a:tailEnd type="none" w="med" len="med"/>
-                    </a:lnL>
-                    <a:lnR w="12700" cap="flat" cmpd="sng" algn="ctr">
-                      <a:solidFill>
-                        <a:schemeClr val="tx1"/>
-                      </a:solidFill>
-                      <a:prstDash val="solid"/>
-                      <a:round/>
-                      <a:headEnd type="none" w="med" len="med"/>
-                      <a:tailEnd type="none" w="med" len="med"/>
-                    </a:lnR>
-                    <a:lnT w="12700" cap="flat" cmpd="sng" algn="ctr">
-                      <a:solidFill>
-                        <a:schemeClr val="tx1"/>
-                      </a:solidFill>
-                      <a:prstDash val="solid"/>
-                      <a:round/>
-                      <a:headEnd type="none" w="med" len="med"/>
-                      <a:tailEnd type="none" w="med" len="med"/>
-                    </a:lnT>
-                    <a:lnB w="12700" cap="flat" cmpd="sng" algn="ctr">
-                      <a:solidFill>
-                        <a:schemeClr val="tx1"/>
-                      </a:solidFill>
-                      <a:prstDash val="solid"/>
-                      <a:round/>
-                      <a:headEnd type="none" w="med" len="med"/>
-                      <a:tailEnd type="none" w="med" len="med"/>
-                    </a:lnB>
-                    <a:lnTlToBr w="12700" cmpd="sng">
-                      <a:noFill/>
-                      <a:prstDash val="solid"/>
-                    </a:lnTlToBr>
-                    <a:lnBlToTr w="12700" cmpd="sng">
-                      <a:noFill/>
-                      <a:prstDash val="solid"/>
-                    </a:lnBlToTr>
-                    <a:solidFill>
-                      <a:schemeClr val="bg1"/>
-                    </a:solidFill>
-                  </a:tcPr>
-                </a:tc>
-                <a:extLst>
-                  <a:ext uri="{0D108BD9-81ED-4DB2-BD59-A6C34878D82A}">
-                    <a16:rowId xmlns:a16="http://schemas.microsoft.com/office/drawing/2014/main" val="713313710"/>
-                  </a:ext>
-                </a:extLst>
-              </a:tr>
-            </a:tbl>
-          </a:graphicData>
-        </a:graphic>
-      </p:graphicFrame>
-      <p:graphicFrame>
-        <p:nvGraphicFramePr>
-          <p:cNvPr id="3" name="Table 2">
-            <a:extLst>
-              <a:ext uri="{FF2B5EF4-FFF2-40B4-BE49-F238E27FC236}">
-                <a16:creationId xmlns:a16="http://schemas.microsoft.com/office/drawing/2014/main" id="{E25E9F01-C70B-C10F-821D-82F0B0C07AB1}"/>
-              </a:ext>
-            </a:extLst>
-          </p:cNvPr>
-          <p:cNvGraphicFramePr>
-            <a:graphicFrameLocks noGrp="1"/>
-          </p:cNvGraphicFramePr>
-          <p:nvPr>
-            <p:extLst>
-              <p:ext uri="{D42A27DB-BD31-4B8C-83A1-F6EECF244321}">
-                <p14:modId xmlns:p14="http://schemas.microsoft.com/office/powerpoint/2010/main" val="899404646"/>
-              </p:ext>
-            </p:extLst>
-          </p:nvPr>
-        </p:nvGraphicFramePr>
-        <p:xfrm>
-          <a:off x="7419788" y="2262897"/>
-          <a:ext cx="2644588" cy="848052"/>
-        </p:xfrm>
-        <a:graphic>
-          <a:graphicData uri="http://schemas.openxmlformats.org/drawingml/2006/table">
-            <a:tbl>
-              <a:tblPr firstRow="1" bandRow="1">
-                <a:tableStyleId>{5C22544A-7EE6-4342-B048-85BDC9FD1C3A}</a:tableStyleId>
-              </a:tblPr>
-              <a:tblGrid>
-                <a:gridCol w="1322294">
-                  <a:extLst>
-                    <a:ext uri="{9D8B030D-6E8A-4147-A177-3AD203B41FA5}">
-                      <a16:colId xmlns:a16="http://schemas.microsoft.com/office/drawing/2014/main" val="1781345222"/>
-                    </a:ext>
-                  </a:extLst>
-                </a:gridCol>
-                <a:gridCol w="1322294">
-                  <a:extLst>
-                    <a:ext uri="{9D8B030D-6E8A-4147-A177-3AD203B41FA5}">
-                      <a16:colId xmlns:a16="http://schemas.microsoft.com/office/drawing/2014/main" val="2428297054"/>
-                    </a:ext>
-                  </a:extLst>
-                </a:gridCol>
-              </a:tblGrid>
-              <a:tr h="281143">
-                <a:tc gridSpan="2">
-                  <a:txBody>
-                    <a:bodyPr/>
-                    <a:lstStyle/>
-                    <a:p>
-                      <a:r>
-                        <a:rPr lang="en-GB" sz="1400" dirty="0">
-                          <a:solidFill>
-                            <a:schemeClr val="tx1"/>
-                          </a:solidFill>
-                        </a:rPr>
-                        <a:t>Post belongs to topic</a:t>
-                      </a:r>
-                    </a:p>
-                  </a:txBody>
-                  <a:tcPr marL="69323" marR="69323" marT="34662" marB="34662">
-                    <a:lnL w="12700" cap="flat" cmpd="sng" algn="ctr">
-                      <a:solidFill>
-                        <a:schemeClr val="tx1"/>
-                      </a:solidFill>
-                      <a:prstDash val="solid"/>
-                      <a:round/>
-                      <a:headEnd type="none" w="med" len="med"/>
-                      <a:tailEnd type="none" w="med" len="med"/>
-                    </a:lnL>
-                    <a:lnR w="12700" cap="flat" cmpd="sng" algn="ctr">
-                      <a:solidFill>
-                        <a:schemeClr val="tx1"/>
-                      </a:solidFill>
-                      <a:prstDash val="solid"/>
-                      <a:round/>
-                      <a:headEnd type="none" w="med" len="med"/>
-                      <a:tailEnd type="none" w="med" len="med"/>
-                    </a:lnR>
-                    <a:lnT w="12700" cap="flat" cmpd="sng" algn="ctr">
-                      <a:solidFill>
-                        <a:schemeClr val="tx1"/>
-                      </a:solidFill>
-                      <a:prstDash val="solid"/>
-                      <a:round/>
-                      <a:headEnd type="none" w="med" len="med"/>
-                      <a:tailEnd type="none" w="med" len="med"/>
-                    </a:lnT>
-                    <a:lnB w="12700" cap="flat" cmpd="sng" algn="ctr">
-                      <a:solidFill>
-                        <a:schemeClr val="tx1"/>
-                      </a:solidFill>
-                      <a:prstDash val="solid"/>
-                      <a:round/>
-                      <a:headEnd type="none" w="med" len="med"/>
-                      <a:tailEnd type="none" w="med" len="med"/>
-                    </a:lnB>
-                    <a:lnTlToBr w="12700" cmpd="sng">
-                      <a:noFill/>
-                      <a:prstDash val="solid"/>
-                    </a:lnTlToBr>
-                    <a:lnBlToTr w="12700" cmpd="sng">
-                      <a:noFill/>
-                      <a:prstDash val="solid"/>
-                    </a:lnBlToTr>
-                    <a:solidFill>
-                      <a:schemeClr val="bg1"/>
-                    </a:solidFill>
-                  </a:tcPr>
-                </a:tc>
-                <a:tc hMerge="1">
-                  <a:txBody>
-                    <a:bodyPr/>
-                    <a:lstStyle/>
-                    <a:p>
-                      <a:endParaRPr lang="en-GB" sz="1400" dirty="0">
-                        <a:solidFill>
-                          <a:schemeClr val="tx1"/>
-                        </a:solidFill>
-                      </a:endParaRPr>
-                    </a:p>
-                  </a:txBody>
-                  <a:tcPr marL="69323" marR="69323" marT="34662" marB="34662">
-                    <a:lnL w="12700" cap="flat" cmpd="sng" algn="ctr">
-                      <a:solidFill>
-                        <a:schemeClr val="tx1"/>
-                      </a:solidFill>
-                      <a:prstDash val="solid"/>
-                      <a:round/>
-                      <a:headEnd type="none" w="med" len="med"/>
-                      <a:tailEnd type="none" w="med" len="med"/>
-                    </a:lnL>
-                    <a:lnR w="12700" cap="flat" cmpd="sng" algn="ctr">
-                      <a:solidFill>
-                        <a:schemeClr val="tx1"/>
-                      </a:solidFill>
-                      <a:prstDash val="solid"/>
-                      <a:round/>
-                      <a:headEnd type="none" w="med" len="med"/>
-                      <a:tailEnd type="none" w="med" len="med"/>
-                    </a:lnR>
-                    <a:lnT w="12700" cap="flat" cmpd="sng" algn="ctr">
-                      <a:solidFill>
-                        <a:schemeClr val="tx1"/>
-                      </a:solidFill>
-                      <a:prstDash val="solid"/>
-                      <a:round/>
-                      <a:headEnd type="none" w="med" len="med"/>
-                      <a:tailEnd type="none" w="med" len="med"/>
-                    </a:lnT>
-                    <a:lnB w="12700" cap="flat" cmpd="sng" algn="ctr">
-                      <a:solidFill>
-                        <a:schemeClr val="tx1"/>
-                      </a:solidFill>
-                      <a:prstDash val="solid"/>
-                      <a:round/>
-                      <a:headEnd type="none" w="med" len="med"/>
-                      <a:tailEnd type="none" w="med" len="med"/>
-                    </a:lnB>
-                    <a:lnTlToBr w="12700" cmpd="sng">
-                      <a:noFill/>
-                      <a:prstDash val="solid"/>
-                    </a:lnTlToBr>
-                    <a:lnBlToTr w="12700" cmpd="sng">
-                      <a:noFill/>
-                      <a:prstDash val="solid"/>
-                    </a:lnBlToTr>
-                    <a:solidFill>
-                      <a:schemeClr val="bg1"/>
-                    </a:solidFill>
-                  </a:tcPr>
-                </a:tc>
-                <a:extLst>
-                  <a:ext uri="{0D108BD9-81ED-4DB2-BD59-A6C34878D82A}">
-                    <a16:rowId xmlns:a16="http://schemas.microsoft.com/office/drawing/2014/main" val="3887986916"/>
-                  </a:ext>
-                </a:extLst>
-              </a:tr>
-              <a:tr h="281143">
-                <a:tc>
-                  <a:txBody>
-                    <a:bodyPr/>
-                    <a:lstStyle/>
-                    <a:p>
-                      <a:r>
-                        <a:rPr lang="en-GB" sz="1400" dirty="0">
-                          <a:solidFill>
-                            <a:schemeClr val="tx1"/>
-                          </a:solidFill>
-                        </a:rPr>
-                        <a:t>Post id</a:t>
+                        <a:t>User id</a:t>
                       </a:r>
                     </a:p>
                   </a:txBody>
@@ -6798,263 +6478,7 @@
                             <a:schemeClr val="tx1"/>
                           </a:solidFill>
                         </a:rPr>
-                        <a:t>int</a:t>
-                      </a:r>
-                    </a:p>
-                  </a:txBody>
-                  <a:tcPr marL="69323" marR="69323" marT="34662" marB="34662">
-                    <a:lnL w="12700" cap="flat" cmpd="sng" algn="ctr">
-                      <a:solidFill>
-                        <a:schemeClr val="tx1"/>
-                      </a:solidFill>
-                      <a:prstDash val="solid"/>
-                      <a:round/>
-                      <a:headEnd type="none" w="med" len="med"/>
-                      <a:tailEnd type="none" w="med" len="med"/>
-                    </a:lnL>
-                    <a:lnR w="12700" cap="flat" cmpd="sng" algn="ctr">
-                      <a:solidFill>
-                        <a:schemeClr val="tx1"/>
-                      </a:solidFill>
-                      <a:prstDash val="solid"/>
-                      <a:round/>
-                      <a:headEnd type="none" w="med" len="med"/>
-                      <a:tailEnd type="none" w="med" len="med"/>
-                    </a:lnR>
-                    <a:lnT w="12700" cap="flat" cmpd="sng" algn="ctr">
-                      <a:solidFill>
-                        <a:schemeClr val="tx1"/>
-                      </a:solidFill>
-                      <a:prstDash val="solid"/>
-                      <a:round/>
-                      <a:headEnd type="none" w="med" len="med"/>
-                      <a:tailEnd type="none" w="med" len="med"/>
-                    </a:lnT>
-                    <a:lnB w="12700" cap="flat" cmpd="sng" algn="ctr">
-                      <a:solidFill>
-                        <a:schemeClr val="tx1"/>
-                      </a:solidFill>
-                      <a:prstDash val="solid"/>
-                      <a:round/>
-                      <a:headEnd type="none" w="med" len="med"/>
-                      <a:tailEnd type="none" w="med" len="med"/>
-                    </a:lnB>
-                    <a:lnTlToBr w="12700" cmpd="sng">
-                      <a:noFill/>
-                      <a:prstDash val="solid"/>
-                    </a:lnTlToBr>
-                    <a:lnBlToTr w="12700" cmpd="sng">
-                      <a:noFill/>
-                      <a:prstDash val="solid"/>
-                    </a:lnBlToTr>
-                    <a:solidFill>
-                      <a:schemeClr val="bg1"/>
-                    </a:solidFill>
-                  </a:tcPr>
-                </a:tc>
-                <a:extLst>
-                  <a:ext uri="{0D108BD9-81ED-4DB2-BD59-A6C34878D82A}">
-                    <a16:rowId xmlns:a16="http://schemas.microsoft.com/office/drawing/2014/main" val="713313710"/>
-                  </a:ext>
-                </a:extLst>
-              </a:tr>
-            </a:tbl>
-          </a:graphicData>
-        </a:graphic>
-      </p:graphicFrame>
-      <p:graphicFrame>
-        <p:nvGraphicFramePr>
-          <p:cNvPr id="4" name="Table 3">
-            <a:extLst>
-              <a:ext uri="{FF2B5EF4-FFF2-40B4-BE49-F238E27FC236}">
-                <a16:creationId xmlns:a16="http://schemas.microsoft.com/office/drawing/2014/main" id="{F9F9D132-77C1-8009-2ACE-806C5915CE09}"/>
-              </a:ext>
-            </a:extLst>
-          </p:cNvPr>
-          <p:cNvGraphicFramePr>
-            <a:graphicFrameLocks noGrp="1"/>
-          </p:cNvGraphicFramePr>
-          <p:nvPr>
-            <p:extLst>
-              <p:ext uri="{D42A27DB-BD31-4B8C-83A1-F6EECF244321}">
-                <p14:modId xmlns:p14="http://schemas.microsoft.com/office/powerpoint/2010/main" val="160960046"/>
-              </p:ext>
-            </p:extLst>
-          </p:nvPr>
-        </p:nvGraphicFramePr>
-        <p:xfrm>
-          <a:off x="1664447" y="2477744"/>
-          <a:ext cx="2644588" cy="848052"/>
-        </p:xfrm>
-        <a:graphic>
-          <a:graphicData uri="http://schemas.openxmlformats.org/drawingml/2006/table">
-            <a:tbl>
-              <a:tblPr firstRow="1" bandRow="1">
-                <a:tableStyleId>{5C22544A-7EE6-4342-B048-85BDC9FD1C3A}</a:tableStyleId>
-              </a:tblPr>
-              <a:tblGrid>
-                <a:gridCol w="1322294">
-                  <a:extLst>
-                    <a:ext uri="{9D8B030D-6E8A-4147-A177-3AD203B41FA5}">
-                      <a16:colId xmlns:a16="http://schemas.microsoft.com/office/drawing/2014/main" val="1781345222"/>
-                    </a:ext>
-                  </a:extLst>
-                </a:gridCol>
-                <a:gridCol w="1322294">
-                  <a:extLst>
-                    <a:ext uri="{9D8B030D-6E8A-4147-A177-3AD203B41FA5}">
-                      <a16:colId xmlns:a16="http://schemas.microsoft.com/office/drawing/2014/main" val="2428297054"/>
-                    </a:ext>
-                  </a:extLst>
-                </a:gridCol>
-              </a:tblGrid>
-              <a:tr h="281143">
-                <a:tc gridSpan="2">
-                  <a:txBody>
-                    <a:bodyPr/>
-                    <a:lstStyle/>
-                    <a:p>
-                      <a:r>
-                        <a:rPr lang="en-GB" sz="1400" dirty="0">
-                          <a:solidFill>
-                            <a:schemeClr val="tx1"/>
-                          </a:solidFill>
-                        </a:rPr>
-                        <a:t>Post belongs to user</a:t>
-                      </a:r>
-                    </a:p>
-                  </a:txBody>
-                  <a:tcPr marL="69323" marR="69323" marT="34662" marB="34662">
-                    <a:lnL w="12700" cap="flat" cmpd="sng" algn="ctr">
-                      <a:solidFill>
-                        <a:schemeClr val="tx1"/>
-                      </a:solidFill>
-                      <a:prstDash val="solid"/>
-                      <a:round/>
-                      <a:headEnd type="none" w="med" len="med"/>
-                      <a:tailEnd type="none" w="med" len="med"/>
-                    </a:lnL>
-                    <a:lnR w="12700" cap="flat" cmpd="sng" algn="ctr">
-                      <a:solidFill>
-                        <a:schemeClr val="tx1"/>
-                      </a:solidFill>
-                      <a:prstDash val="solid"/>
-                      <a:round/>
-                      <a:headEnd type="none" w="med" len="med"/>
-                      <a:tailEnd type="none" w="med" len="med"/>
-                    </a:lnR>
-                    <a:lnT w="12700" cap="flat" cmpd="sng" algn="ctr">
-                      <a:solidFill>
-                        <a:schemeClr val="tx1"/>
-                      </a:solidFill>
-                      <a:prstDash val="solid"/>
-                      <a:round/>
-                      <a:headEnd type="none" w="med" len="med"/>
-                      <a:tailEnd type="none" w="med" len="med"/>
-                    </a:lnT>
-                    <a:lnB w="12700" cap="flat" cmpd="sng" algn="ctr">
-                      <a:solidFill>
-                        <a:schemeClr val="tx1"/>
-                      </a:solidFill>
-                      <a:prstDash val="solid"/>
-                      <a:round/>
-                      <a:headEnd type="none" w="med" len="med"/>
-                      <a:tailEnd type="none" w="med" len="med"/>
-                    </a:lnB>
-                    <a:lnTlToBr w="12700" cmpd="sng">
-                      <a:noFill/>
-                      <a:prstDash val="solid"/>
-                    </a:lnTlToBr>
-                    <a:lnBlToTr w="12700" cmpd="sng">
-                      <a:noFill/>
-                      <a:prstDash val="solid"/>
-                    </a:lnBlToTr>
-                    <a:solidFill>
-                      <a:schemeClr val="bg1"/>
-                    </a:solidFill>
-                  </a:tcPr>
-                </a:tc>
-                <a:tc hMerge="1">
-                  <a:txBody>
-                    <a:bodyPr/>
-                    <a:lstStyle/>
-                    <a:p>
-                      <a:endParaRPr lang="en-GB" sz="1400" dirty="0">
-                        <a:solidFill>
-                          <a:schemeClr val="tx1"/>
-                        </a:solidFill>
-                      </a:endParaRPr>
-                    </a:p>
-                  </a:txBody>
-                  <a:tcPr marL="69323" marR="69323" marT="34662" marB="34662">
-                    <a:lnL w="12700" cap="flat" cmpd="sng" algn="ctr">
-                      <a:solidFill>
-                        <a:schemeClr val="tx1"/>
-                      </a:solidFill>
-                      <a:prstDash val="solid"/>
-                      <a:round/>
-                      <a:headEnd type="none" w="med" len="med"/>
-                      <a:tailEnd type="none" w="med" len="med"/>
-                    </a:lnL>
-                    <a:lnR w="12700" cap="flat" cmpd="sng" algn="ctr">
-                      <a:solidFill>
-                        <a:schemeClr val="tx1"/>
-                      </a:solidFill>
-                      <a:prstDash val="solid"/>
-                      <a:round/>
-                      <a:headEnd type="none" w="med" len="med"/>
-                      <a:tailEnd type="none" w="med" len="med"/>
-                    </a:lnR>
-                    <a:lnT w="12700" cap="flat" cmpd="sng" algn="ctr">
-                      <a:solidFill>
-                        <a:schemeClr val="tx1"/>
-                      </a:solidFill>
-                      <a:prstDash val="solid"/>
-                      <a:round/>
-                      <a:headEnd type="none" w="med" len="med"/>
-                      <a:tailEnd type="none" w="med" len="med"/>
-                    </a:lnT>
-                    <a:lnB w="12700" cap="flat" cmpd="sng" algn="ctr">
-                      <a:solidFill>
-                        <a:schemeClr val="tx1"/>
-                      </a:solidFill>
-                      <a:prstDash val="solid"/>
-                      <a:round/>
-                      <a:headEnd type="none" w="med" len="med"/>
-                      <a:tailEnd type="none" w="med" len="med"/>
-                    </a:lnB>
-                    <a:lnTlToBr w="12700" cmpd="sng">
-                      <a:noFill/>
-                      <a:prstDash val="solid"/>
-                    </a:lnTlToBr>
-                    <a:lnBlToTr w="12700" cmpd="sng">
-                      <a:noFill/>
-                      <a:prstDash val="solid"/>
-                    </a:lnBlToTr>
-                    <a:solidFill>
-                      <a:schemeClr val="bg1"/>
-                    </a:solidFill>
-                  </a:tcPr>
-                </a:tc>
-                <a:extLst>
-                  <a:ext uri="{0D108BD9-81ED-4DB2-BD59-A6C34878D82A}">
-                    <a16:rowId xmlns:a16="http://schemas.microsoft.com/office/drawing/2014/main" val="3887986916"/>
-                  </a:ext>
-                </a:extLst>
-              </a:tr>
-              <a:tr h="281143">
-                <a:tc>
-                  <a:txBody>
-                    <a:bodyPr/>
-                    <a:lstStyle/>
-                    <a:p>
-                      <a:r>
-                        <a:rPr lang="en-GB" sz="1400" dirty="0">
-                          <a:solidFill>
-                            <a:schemeClr val="tx1"/>
-                          </a:solidFill>
-                        </a:rPr>
-                        <a:t>User id</a:t>
+                        <a:t>15 char length</a:t>
                       </a:r>
                     </a:p>
                   </a:txBody>
@@ -7119,7 +6543,7 @@
                             <a:schemeClr val="tx1"/>
                           </a:solidFill>
                         </a:rPr>
-                        <a:t>Post id</a:t>
+                        <a:t>400 char length</a:t>
                       </a:r>
                     </a:p>
                   </a:txBody>
@@ -7173,13 +6597,71 @@
                     </a:solidFill>
                   </a:tcPr>
                 </a:tc>
-                <a:extLst>
-                  <a:ext uri="{0D108BD9-81ED-4DB2-BD59-A6C34878D82A}">
-                    <a16:rowId xmlns:a16="http://schemas.microsoft.com/office/drawing/2014/main" val="1315690800"/>
-                  </a:ext>
-                </a:extLst>
-              </a:tr>
-              <a:tr h="281143">
+                <a:tc>
+                  <a:txBody>
+                    <a:bodyPr/>
+                    <a:lstStyle/>
+                    <a:p>
+                      <a:r>
+                        <a:rPr lang="en-GB" sz="1400" dirty="0">
+                          <a:solidFill>
+                            <a:schemeClr val="tx1"/>
+                          </a:solidFill>
+                        </a:rPr>
+                        <a:t>int</a:t>
+                      </a:r>
+                    </a:p>
+                  </a:txBody>
+                  <a:tcPr marL="69323" marR="69323" marT="34662" marB="34662">
+                    <a:lnL w="12700" cap="flat" cmpd="sng" algn="ctr">
+                      <a:solidFill>
+                        <a:schemeClr val="tx1"/>
+                      </a:solidFill>
+                      <a:prstDash val="solid"/>
+                      <a:round/>
+                      <a:headEnd type="none" w="med" len="med"/>
+                      <a:tailEnd type="none" w="med" len="med"/>
+                    </a:lnL>
+                    <a:lnR w="12700" cap="flat" cmpd="sng" algn="ctr">
+                      <a:solidFill>
+                        <a:schemeClr val="tx1"/>
+                      </a:solidFill>
+                      <a:prstDash val="solid"/>
+                      <a:round/>
+                      <a:headEnd type="none" w="med" len="med"/>
+                      <a:tailEnd type="none" w="med" len="med"/>
+                    </a:lnR>
+                    <a:lnT w="12700" cap="flat" cmpd="sng" algn="ctr">
+                      <a:solidFill>
+                        <a:schemeClr val="tx1"/>
+                      </a:solidFill>
+                      <a:prstDash val="solid"/>
+                      <a:round/>
+                      <a:headEnd type="none" w="med" len="med"/>
+                      <a:tailEnd type="none" w="med" len="med"/>
+                    </a:lnT>
+                    <a:lnB w="12700" cap="flat" cmpd="sng" algn="ctr">
+                      <a:solidFill>
+                        <a:schemeClr val="tx1"/>
+                      </a:solidFill>
+                      <a:prstDash val="solid"/>
+                      <a:round/>
+                      <a:headEnd type="none" w="med" len="med"/>
+                      <a:tailEnd type="none" w="med" len="med"/>
+                    </a:lnB>
+                    <a:lnTlToBr w="12700" cmpd="sng">
+                      <a:noFill/>
+                      <a:prstDash val="solid"/>
+                    </a:lnTlToBr>
+                    <a:lnBlToTr w="12700" cmpd="sng">
+                      <a:noFill/>
+                      <a:prstDash val="solid"/>
+                    </a:lnBlToTr>
+                    <a:solidFill>
+                      <a:schemeClr val="bg1"/>
+                    </a:solidFill>
+                  </a:tcPr>
+                </a:tc>
                 <a:tc>
                   <a:txBody>
                     <a:bodyPr/>
@@ -7484,22 +6966,24 @@
       </p:cxnSp>
       <p:cxnSp>
         <p:nvCxnSpPr>
-          <p:cNvPr id="29" name="Straight Arrow Connector 28">
-            <a:extLst>
-              <a:ext uri="{FF2B5EF4-FFF2-40B4-BE49-F238E27FC236}">
-                <a16:creationId xmlns:a16="http://schemas.microsoft.com/office/drawing/2014/main" id="{CD739D0B-D8AF-CA95-16E6-95913079BEA7}"/>
+          <p:cNvPr id="9" name="Straight Arrow Connector 8">
+            <a:extLst>
+              <a:ext uri="{FF2B5EF4-FFF2-40B4-BE49-F238E27FC236}">
+                <a16:creationId xmlns:a16="http://schemas.microsoft.com/office/drawing/2014/main" id="{7CE9BE2D-AB34-BA5A-19B3-37326FD7D789}"/>
               </a:ext>
             </a:extLst>
           </p:cNvPr>
           <p:cNvCxnSpPr>
-            <a:endCxn id="4" idx="2"/>
+            <a:cxnSpLocks/>
+            <a:stCxn id="8" idx="2"/>
+            <a:endCxn id="7" idx="0"/>
           </p:cNvCxnSpPr>
           <p:nvPr/>
         </p:nvCxnSpPr>
         <p:spPr>
-          <a:xfrm flipV="1">
-            <a:off x="2331571" y="3325796"/>
-            <a:ext cx="655170" cy="766592"/>
+          <a:xfrm>
+            <a:off x="5155079" y="1711152"/>
+            <a:ext cx="3905250" cy="2459925"/>
           </a:xfrm>
           <a:prstGeom prst="straightConnector1">
             <a:avLst/>
@@ -7525,10 +7009,10 @@
       </p:cxnSp>
       <p:cxnSp>
         <p:nvCxnSpPr>
-          <p:cNvPr id="31" name="Straight Arrow Connector 30">
-            <a:extLst>
-              <a:ext uri="{FF2B5EF4-FFF2-40B4-BE49-F238E27FC236}">
-                <a16:creationId xmlns:a16="http://schemas.microsoft.com/office/drawing/2014/main" id="{19675776-2158-7439-1776-E4C39D7263B1}"/>
+          <p:cNvPr id="14" name="Straight Arrow Connector 13">
+            <a:extLst>
+              <a:ext uri="{FF2B5EF4-FFF2-40B4-BE49-F238E27FC236}">
+                <a16:creationId xmlns:a16="http://schemas.microsoft.com/office/drawing/2014/main" id="{E86C2112-A08E-E7D3-12D0-462652855C5F}"/>
               </a:ext>
             </a:extLst>
           </p:cNvPr>
@@ -7536,167 +7020,9 @@
           <p:nvPr/>
         </p:nvCxnSpPr>
         <p:spPr>
-          <a:xfrm flipH="1" flipV="1">
-            <a:off x="2241176" y="3325796"/>
-            <a:ext cx="90395" cy="845281"/>
-          </a:xfrm>
-          <a:prstGeom prst="straightConnector1">
-            <a:avLst/>
-          </a:prstGeom>
-          <a:ln>
-            <a:tailEnd type="triangle"/>
-          </a:ln>
-        </p:spPr>
-        <p:style>
-          <a:lnRef idx="1">
-            <a:schemeClr val="accent1"/>
-          </a:lnRef>
-          <a:fillRef idx="0">
-            <a:schemeClr val="accent1"/>
-          </a:fillRef>
-          <a:effectRef idx="0">
-            <a:schemeClr val="accent1"/>
-          </a:effectRef>
-          <a:fontRef idx="minor">
-            <a:schemeClr val="tx1"/>
-          </a:fontRef>
-        </p:style>
-      </p:cxnSp>
-      <p:cxnSp>
-        <p:nvCxnSpPr>
-          <p:cNvPr id="33" name="Straight Arrow Connector 32">
-            <a:extLst>
-              <a:ext uri="{FF2B5EF4-FFF2-40B4-BE49-F238E27FC236}">
-                <a16:creationId xmlns:a16="http://schemas.microsoft.com/office/drawing/2014/main" id="{79F8A7BA-52B6-0D75-E668-5FD638B63A9E}"/>
-              </a:ext>
-            </a:extLst>
-          </p:cNvPr>
-          <p:cNvCxnSpPr/>
-          <p:nvPr/>
-        </p:nvCxnSpPr>
-        <p:spPr>
-          <a:xfrm flipV="1">
-            <a:off x="3299012" y="1711152"/>
-            <a:ext cx="1010023" cy="766592"/>
-          </a:xfrm>
-          <a:prstGeom prst="straightConnector1">
-            <a:avLst/>
-          </a:prstGeom>
-          <a:ln>
-            <a:tailEnd type="triangle"/>
-          </a:ln>
-        </p:spPr>
-        <p:style>
-          <a:lnRef idx="1">
-            <a:schemeClr val="accent1"/>
-          </a:lnRef>
-          <a:fillRef idx="0">
-            <a:schemeClr val="accent1"/>
-          </a:fillRef>
-          <a:effectRef idx="0">
-            <a:schemeClr val="accent1"/>
-          </a:effectRef>
-          <a:fontRef idx="minor">
-            <a:schemeClr val="tx1"/>
-          </a:fontRef>
-        </p:style>
-      </p:cxnSp>
-      <p:cxnSp>
-        <p:nvCxnSpPr>
-          <p:cNvPr id="35" name="Straight Arrow Connector 34">
-            <a:extLst>
-              <a:ext uri="{FF2B5EF4-FFF2-40B4-BE49-F238E27FC236}">
-                <a16:creationId xmlns:a16="http://schemas.microsoft.com/office/drawing/2014/main" id="{FCAADAD4-2869-DF09-56D7-082D79453988}"/>
-              </a:ext>
-            </a:extLst>
-          </p:cNvPr>
-          <p:cNvCxnSpPr/>
-          <p:nvPr/>
-        </p:nvCxnSpPr>
-        <p:spPr>
-          <a:xfrm flipH="1" flipV="1">
-            <a:off x="8364071" y="3110949"/>
-            <a:ext cx="502023" cy="981439"/>
-          </a:xfrm>
-          <a:prstGeom prst="straightConnector1">
-            <a:avLst/>
-          </a:prstGeom>
-          <a:ln>
-            <a:tailEnd type="triangle"/>
-          </a:ln>
-        </p:spPr>
-        <p:style>
-          <a:lnRef idx="1">
-            <a:schemeClr val="accent1"/>
-          </a:lnRef>
-          <a:fillRef idx="0">
-            <a:schemeClr val="accent1"/>
-          </a:fillRef>
-          <a:effectRef idx="0">
-            <a:schemeClr val="accent1"/>
-          </a:effectRef>
-          <a:fontRef idx="minor">
-            <a:schemeClr val="tx1"/>
-          </a:fontRef>
-        </p:style>
-      </p:cxnSp>
-      <p:cxnSp>
-        <p:nvCxnSpPr>
-          <p:cNvPr id="37" name="Straight Arrow Connector 36">
-            <a:extLst>
-              <a:ext uri="{FF2B5EF4-FFF2-40B4-BE49-F238E27FC236}">
-                <a16:creationId xmlns:a16="http://schemas.microsoft.com/office/drawing/2014/main" id="{B28D83A3-1141-9CB0-DD53-EA792649BCC4}"/>
-              </a:ext>
-            </a:extLst>
-          </p:cNvPr>
-          <p:cNvCxnSpPr/>
-          <p:nvPr/>
-        </p:nvCxnSpPr>
-        <p:spPr>
-          <a:xfrm flipV="1">
-            <a:off x="8866094" y="3110949"/>
-            <a:ext cx="349624" cy="981439"/>
-          </a:xfrm>
-          <a:prstGeom prst="straightConnector1">
-            <a:avLst/>
-          </a:prstGeom>
-          <a:ln>
-            <a:tailEnd type="triangle"/>
-          </a:ln>
-        </p:spPr>
-        <p:style>
-          <a:lnRef idx="1">
-            <a:schemeClr val="accent1"/>
-          </a:lnRef>
-          <a:fillRef idx="0">
-            <a:schemeClr val="accent1"/>
-          </a:fillRef>
-          <a:effectRef idx="0">
-            <a:schemeClr val="accent1"/>
-          </a:effectRef>
-          <a:fontRef idx="minor">
-            <a:schemeClr val="tx1"/>
-          </a:fontRef>
-        </p:style>
-      </p:cxnSp>
-      <p:cxnSp>
-        <p:nvCxnSpPr>
-          <p:cNvPr id="39" name="Straight Arrow Connector 38">
-            <a:extLst>
-              <a:ext uri="{FF2B5EF4-FFF2-40B4-BE49-F238E27FC236}">
-                <a16:creationId xmlns:a16="http://schemas.microsoft.com/office/drawing/2014/main" id="{38D7BFEC-B28F-ABD2-08B2-D77A58A3C789}"/>
-              </a:ext>
-            </a:extLst>
-          </p:cNvPr>
-          <p:cNvCxnSpPr>
-            <a:endCxn id="8" idx="3"/>
-          </p:cNvCxnSpPr>
-          <p:nvPr/>
-        </p:nvCxnSpPr>
-        <p:spPr>
-          <a:xfrm flipH="1" flipV="1">
-            <a:off x="7637179" y="1287126"/>
-            <a:ext cx="1091456" cy="975771"/>
+          <a:xfrm flipH="1">
+            <a:off x="2079812" y="1711152"/>
+            <a:ext cx="3075267" cy="2381236"/>
           </a:xfrm>
           <a:prstGeom prst="straightConnector1">
             <a:avLst/>

</xml_diff>

<commit_message>
users cannot acces without login + logout works
</commit_message>
<xml_diff>
--- a/database.pptx
+++ b/database.pptx
@@ -263,7 +263,7 @@
           <a:p>
             <a:fld id="{B4E95641-670A-480D-9D2C-8853D86751B7}" type="datetimeFigureOut">
               <a:rPr lang="en-GB" smtClean="0"/>
-              <a:t>06/12/2023</a:t>
+              <a:t>16/12/2023</a:t>
             </a:fld>
             <a:endParaRPr lang="en-GB"/>
           </a:p>
@@ -463,7 +463,7 @@
           <a:p>
             <a:fld id="{B4E95641-670A-480D-9D2C-8853D86751B7}" type="datetimeFigureOut">
               <a:rPr lang="en-GB" smtClean="0"/>
-              <a:t>06/12/2023</a:t>
+              <a:t>16/12/2023</a:t>
             </a:fld>
             <a:endParaRPr lang="en-GB"/>
           </a:p>
@@ -673,7 +673,7 @@
           <a:p>
             <a:fld id="{B4E95641-670A-480D-9D2C-8853D86751B7}" type="datetimeFigureOut">
               <a:rPr lang="en-GB" smtClean="0"/>
-              <a:t>06/12/2023</a:t>
+              <a:t>16/12/2023</a:t>
             </a:fld>
             <a:endParaRPr lang="en-GB"/>
           </a:p>
@@ -873,7 +873,7 @@
           <a:p>
             <a:fld id="{B4E95641-670A-480D-9D2C-8853D86751B7}" type="datetimeFigureOut">
               <a:rPr lang="en-GB" smtClean="0"/>
-              <a:t>06/12/2023</a:t>
+              <a:t>16/12/2023</a:t>
             </a:fld>
             <a:endParaRPr lang="en-GB"/>
           </a:p>
@@ -1149,7 +1149,7 @@
           <a:p>
             <a:fld id="{B4E95641-670A-480D-9D2C-8853D86751B7}" type="datetimeFigureOut">
               <a:rPr lang="en-GB" smtClean="0"/>
-              <a:t>06/12/2023</a:t>
+              <a:t>16/12/2023</a:t>
             </a:fld>
             <a:endParaRPr lang="en-GB"/>
           </a:p>
@@ -1417,7 +1417,7 @@
           <a:p>
             <a:fld id="{B4E95641-670A-480D-9D2C-8853D86751B7}" type="datetimeFigureOut">
               <a:rPr lang="en-GB" smtClean="0"/>
-              <a:t>06/12/2023</a:t>
+              <a:t>16/12/2023</a:t>
             </a:fld>
             <a:endParaRPr lang="en-GB"/>
           </a:p>
@@ -1832,7 +1832,7 @@
           <a:p>
             <a:fld id="{B4E95641-670A-480D-9D2C-8853D86751B7}" type="datetimeFigureOut">
               <a:rPr lang="en-GB" smtClean="0"/>
-              <a:t>06/12/2023</a:t>
+              <a:t>16/12/2023</a:t>
             </a:fld>
             <a:endParaRPr lang="en-GB"/>
           </a:p>
@@ -1974,7 +1974,7 @@
           <a:p>
             <a:fld id="{B4E95641-670A-480D-9D2C-8853D86751B7}" type="datetimeFigureOut">
               <a:rPr lang="en-GB" smtClean="0"/>
-              <a:t>06/12/2023</a:t>
+              <a:t>16/12/2023</a:t>
             </a:fld>
             <a:endParaRPr lang="en-GB"/>
           </a:p>
@@ -2087,7 +2087,7 @@
           <a:p>
             <a:fld id="{B4E95641-670A-480D-9D2C-8853D86751B7}" type="datetimeFigureOut">
               <a:rPr lang="en-GB" smtClean="0"/>
-              <a:t>06/12/2023</a:t>
+              <a:t>16/12/2023</a:t>
             </a:fld>
             <a:endParaRPr lang="en-GB"/>
           </a:p>
@@ -2400,7 +2400,7 @@
           <a:p>
             <a:fld id="{B4E95641-670A-480D-9D2C-8853D86751B7}" type="datetimeFigureOut">
               <a:rPr lang="en-GB" smtClean="0"/>
-              <a:t>06/12/2023</a:t>
+              <a:t>16/12/2023</a:t>
             </a:fld>
             <a:endParaRPr lang="en-GB"/>
           </a:p>
@@ -2689,7 +2689,7 @@
           <a:p>
             <a:fld id="{B4E95641-670A-480D-9D2C-8853D86751B7}" type="datetimeFigureOut">
               <a:rPr lang="en-GB" smtClean="0"/>
-              <a:t>06/12/2023</a:t>
+              <a:t>16/12/2023</a:t>
             </a:fld>
             <a:endParaRPr lang="en-GB"/>
           </a:p>
@@ -2932,7 +2932,7 @@
           <a:p>
             <a:fld id="{B4E95641-670A-480D-9D2C-8853D86751B7}" type="datetimeFigureOut">
               <a:rPr lang="en-GB" smtClean="0"/>
-              <a:t>06/12/2023</a:t>
+              <a:t>16/12/2023</a:t>
             </a:fld>
             <a:endParaRPr lang="en-GB"/>
           </a:p>
@@ -5105,14 +5105,14 @@
           <p:nvPr>
             <p:extLst>
               <p:ext uri="{D42A27DB-BD31-4B8C-83A1-F6EECF244321}">
-                <p14:modId xmlns:p14="http://schemas.microsoft.com/office/powerpoint/2010/main" val="348424160"/>
+                <p14:modId xmlns:p14="http://schemas.microsoft.com/office/powerpoint/2010/main" val="3308937097"/>
               </p:ext>
             </p:extLst>
           </p:nvPr>
         </p:nvGraphicFramePr>
         <p:xfrm>
           <a:off x="7871011" y="4171077"/>
-          <a:ext cx="2378636" cy="848052"/>
+          <a:ext cx="3639672" cy="848052"/>
         </p:xfrm>
         <a:graphic>
           <a:graphicData uri="http://schemas.openxmlformats.org/drawingml/2006/table">
@@ -5121,23 +5121,30 @@
                 <a:tableStyleId>{5C22544A-7EE6-4342-B048-85BDC9FD1C3A}</a:tableStyleId>
               </a:tblPr>
               <a:tblGrid>
-                <a:gridCol w="1189318">
+                <a:gridCol w="744071">
                   <a:extLst>
                     <a:ext uri="{9D8B030D-6E8A-4147-A177-3AD203B41FA5}">
                       <a16:colId xmlns:a16="http://schemas.microsoft.com/office/drawing/2014/main" val="1781345222"/>
                     </a:ext>
                   </a:extLst>
                 </a:gridCol>
-                <a:gridCol w="1189318">
+                <a:gridCol w="1308847">
                   <a:extLst>
                     <a:ext uri="{9D8B030D-6E8A-4147-A177-3AD203B41FA5}">
                       <a16:colId xmlns:a16="http://schemas.microsoft.com/office/drawing/2014/main" val="2428297054"/>
                     </a:ext>
                   </a:extLst>
                 </a:gridCol>
+                <a:gridCol w="1586754">
+                  <a:extLst>
+                    <a:ext uri="{9D8B030D-6E8A-4147-A177-3AD203B41FA5}">
+                      <a16:colId xmlns:a16="http://schemas.microsoft.com/office/drawing/2014/main" val="2308128398"/>
+                    </a:ext>
+                  </a:extLst>
+                </a:gridCol>
               </a:tblGrid>
               <a:tr h="281143">
-                <a:tc gridSpan="2">
+                <a:tc gridSpan="3">
                   <a:txBody>
                     <a:bodyPr/>
                     <a:lstStyle/>
@@ -5150,6 +5157,68 @@
                         </a:rPr>
                         <a:t>Topics and their names</a:t>
                       </a:r>
+                    </a:p>
+                  </a:txBody>
+                  <a:tcPr marL="69323" marR="69323" marT="34662" marB="34662">
+                    <a:lnL w="12700" cap="flat" cmpd="sng" algn="ctr">
+                      <a:solidFill>
+                        <a:schemeClr val="tx1"/>
+                      </a:solidFill>
+                      <a:prstDash val="solid"/>
+                      <a:round/>
+                      <a:headEnd type="none" w="med" len="med"/>
+                      <a:tailEnd type="none" w="med" len="med"/>
+                    </a:lnL>
+                    <a:lnR w="12700" cap="flat" cmpd="sng" algn="ctr">
+                      <a:solidFill>
+                        <a:schemeClr val="tx1"/>
+                      </a:solidFill>
+                      <a:prstDash val="solid"/>
+                      <a:round/>
+                      <a:headEnd type="none" w="med" len="med"/>
+                      <a:tailEnd type="none" w="med" len="med"/>
+                    </a:lnR>
+                    <a:lnT w="12700" cap="flat" cmpd="sng" algn="ctr">
+                      <a:solidFill>
+                        <a:schemeClr val="tx1"/>
+                      </a:solidFill>
+                      <a:prstDash val="solid"/>
+                      <a:round/>
+                      <a:headEnd type="none" w="med" len="med"/>
+                      <a:tailEnd type="none" w="med" len="med"/>
+                    </a:lnT>
+                    <a:lnB w="12700" cap="flat" cmpd="sng" algn="ctr">
+                      <a:solidFill>
+                        <a:schemeClr val="tx1"/>
+                      </a:solidFill>
+                      <a:prstDash val="solid"/>
+                      <a:round/>
+                      <a:headEnd type="none" w="med" len="med"/>
+                      <a:tailEnd type="none" w="med" len="med"/>
+                    </a:lnB>
+                    <a:lnTlToBr w="12700" cmpd="sng">
+                      <a:noFill/>
+                      <a:prstDash val="solid"/>
+                    </a:lnTlToBr>
+                    <a:lnBlToTr w="12700" cmpd="sng">
+                      <a:noFill/>
+                      <a:prstDash val="solid"/>
+                    </a:lnBlToTr>
+                    <a:solidFill>
+                      <a:schemeClr val="bg1"/>
+                    </a:solidFill>
+                  </a:tcPr>
+                </a:tc>
+                <a:tc hMerge="1">
+                  <a:txBody>
+                    <a:bodyPr/>
+                    <a:lstStyle/>
+                    <a:p>
+                      <a:endParaRPr lang="en-GB" sz="1400" dirty="0">
+                        <a:solidFill>
+                          <a:schemeClr val="tx1"/>
+                        </a:solidFill>
+                      </a:endParaRPr>
                     </a:p>
                   </a:txBody>
                   <a:tcPr marL="69323" marR="69323" marT="34662" marB="34662">
@@ -5401,6 +5470,71 @@
                     </a:solidFill>
                   </a:tcPr>
                 </a:tc>
+                <a:tc>
+                  <a:txBody>
+                    <a:bodyPr/>
+                    <a:lstStyle/>
+                    <a:p>
+                      <a:r>
+                        <a:rPr lang="en-GB" sz="1400" dirty="0">
+                          <a:solidFill>
+                            <a:schemeClr val="tx1"/>
+                          </a:solidFill>
+                        </a:rPr>
+                        <a:t>Description</a:t>
+                      </a:r>
+                    </a:p>
+                  </a:txBody>
+                  <a:tcPr marL="69323" marR="69323" marT="34662" marB="34662">
+                    <a:lnL w="12700" cap="flat" cmpd="sng" algn="ctr">
+                      <a:solidFill>
+                        <a:schemeClr val="tx1"/>
+                      </a:solidFill>
+                      <a:prstDash val="solid"/>
+                      <a:round/>
+                      <a:headEnd type="none" w="med" len="med"/>
+                      <a:tailEnd type="none" w="med" len="med"/>
+                    </a:lnL>
+                    <a:lnR w="12700" cap="flat" cmpd="sng" algn="ctr">
+                      <a:solidFill>
+                        <a:schemeClr val="tx1"/>
+                      </a:solidFill>
+                      <a:prstDash val="solid"/>
+                      <a:round/>
+                      <a:headEnd type="none" w="med" len="med"/>
+                      <a:tailEnd type="none" w="med" len="med"/>
+                    </a:lnR>
+                    <a:lnT w="12700" cap="flat" cmpd="sng" algn="ctr">
+                      <a:solidFill>
+                        <a:schemeClr val="tx1"/>
+                      </a:solidFill>
+                      <a:prstDash val="solid"/>
+                      <a:round/>
+                      <a:headEnd type="none" w="med" len="med"/>
+                      <a:tailEnd type="none" w="med" len="med"/>
+                    </a:lnT>
+                    <a:lnB w="12700" cap="flat" cmpd="sng" algn="ctr">
+                      <a:solidFill>
+                        <a:schemeClr val="tx1"/>
+                      </a:solidFill>
+                      <a:prstDash val="solid"/>
+                      <a:round/>
+                      <a:headEnd type="none" w="med" len="med"/>
+                      <a:tailEnd type="none" w="med" len="med"/>
+                    </a:lnB>
+                    <a:lnTlToBr w="12700" cmpd="sng">
+                      <a:noFill/>
+                      <a:prstDash val="solid"/>
+                    </a:lnTlToBr>
+                    <a:lnBlToTr w="12700" cmpd="sng">
+                      <a:noFill/>
+                      <a:prstDash val="solid"/>
+                    </a:lnBlToTr>
+                    <a:solidFill>
+                      <a:schemeClr val="bg1"/>
+                    </a:solidFill>
+                  </a:tcPr>
+                </a:tc>
                 <a:extLst>
                   <a:ext uri="{0D108BD9-81ED-4DB2-BD59-A6C34878D82A}">
                     <a16:rowId xmlns:a16="http://schemas.microsoft.com/office/drawing/2014/main" val="1315690800"/>
@@ -5538,6 +5672,71 @@
                     </a:solidFill>
                   </a:tcPr>
                 </a:tc>
+                <a:tc>
+                  <a:txBody>
+                    <a:bodyPr/>
+                    <a:lstStyle/>
+                    <a:p>
+                      <a:r>
+                        <a:rPr lang="en-GB" sz="1400" dirty="0">
+                          <a:solidFill>
+                            <a:schemeClr val="tx1"/>
+                          </a:solidFill>
+                        </a:rPr>
+                        <a:t>200 char length</a:t>
+                      </a:r>
+                    </a:p>
+                  </a:txBody>
+                  <a:tcPr marL="69323" marR="69323" marT="34662" marB="34662">
+                    <a:lnL w="12700" cap="flat" cmpd="sng" algn="ctr">
+                      <a:solidFill>
+                        <a:schemeClr val="tx1"/>
+                      </a:solidFill>
+                      <a:prstDash val="solid"/>
+                      <a:round/>
+                      <a:headEnd type="none" w="med" len="med"/>
+                      <a:tailEnd type="none" w="med" len="med"/>
+                    </a:lnL>
+                    <a:lnR w="12700" cap="flat" cmpd="sng" algn="ctr">
+                      <a:solidFill>
+                        <a:schemeClr val="tx1"/>
+                      </a:solidFill>
+                      <a:prstDash val="solid"/>
+                      <a:round/>
+                      <a:headEnd type="none" w="med" len="med"/>
+                      <a:tailEnd type="none" w="med" len="med"/>
+                    </a:lnR>
+                    <a:lnT w="12700" cap="flat" cmpd="sng" algn="ctr">
+                      <a:solidFill>
+                        <a:schemeClr val="tx1"/>
+                      </a:solidFill>
+                      <a:prstDash val="solid"/>
+                      <a:round/>
+                      <a:headEnd type="none" w="med" len="med"/>
+                      <a:tailEnd type="none" w="med" len="med"/>
+                    </a:lnT>
+                    <a:lnB w="12700" cap="flat" cmpd="sng" algn="ctr">
+                      <a:solidFill>
+                        <a:schemeClr val="tx1"/>
+                      </a:solidFill>
+                      <a:prstDash val="solid"/>
+                      <a:round/>
+                      <a:headEnd type="none" w="med" len="med"/>
+                      <a:tailEnd type="none" w="med" len="med"/>
+                    </a:lnB>
+                    <a:lnTlToBr w="12700" cmpd="sng">
+                      <a:noFill/>
+                      <a:prstDash val="solid"/>
+                    </a:lnTlToBr>
+                    <a:lnBlToTr w="12700" cmpd="sng">
+                      <a:noFill/>
+                      <a:prstDash val="solid"/>
+                    </a:lnBlToTr>
+                    <a:solidFill>
+                      <a:schemeClr val="bg1"/>
+                    </a:solidFill>
+                  </a:tcPr>
+                </a:tc>
                 <a:extLst>
                   <a:ext uri="{0D108BD9-81ED-4DB2-BD59-A6C34878D82A}">
                     <a16:rowId xmlns:a16="http://schemas.microsoft.com/office/drawing/2014/main" val="713313710"/>
@@ -5563,14 +5762,14 @@
           <p:nvPr>
             <p:extLst>
               <p:ext uri="{D42A27DB-BD31-4B8C-83A1-F6EECF244321}">
-                <p14:modId xmlns:p14="http://schemas.microsoft.com/office/powerpoint/2010/main" val="2250963437"/>
+                <p14:modId xmlns:p14="http://schemas.microsoft.com/office/powerpoint/2010/main" val="4095325052"/>
               </p:ext>
             </p:extLst>
           </p:nvPr>
         </p:nvGraphicFramePr>
         <p:xfrm>
           <a:off x="2331569" y="863100"/>
-          <a:ext cx="5647020" cy="848052"/>
+          <a:ext cx="7547536" cy="1061412"/>
         </p:xfrm>
         <a:graphic>
           <a:graphicData uri="http://schemas.openxmlformats.org/drawingml/2006/table">
@@ -5579,45 +5778,52 @@
                 <a:tableStyleId>{5C22544A-7EE6-4342-B048-85BDC9FD1C3A}</a:tableStyleId>
               </a:tblPr>
               <a:tblGrid>
-                <a:gridCol w="725396">
+                <a:gridCol w="863924">
                   <a:extLst>
                     <a:ext uri="{9D8B030D-6E8A-4147-A177-3AD203B41FA5}">
                       <a16:colId xmlns:a16="http://schemas.microsoft.com/office/drawing/2014/main" val="1781345222"/>
                     </a:ext>
                   </a:extLst>
                 </a:gridCol>
-                <a:gridCol w="1290917">
+                <a:gridCol w="1537443">
                   <a:extLst>
                     <a:ext uri="{9D8B030D-6E8A-4147-A177-3AD203B41FA5}">
                       <a16:colId xmlns:a16="http://schemas.microsoft.com/office/drawing/2014/main" val="2428297054"/>
                     </a:ext>
                   </a:extLst>
                 </a:gridCol>
-                <a:gridCol w="1416424">
+                <a:gridCol w="1686918">
                   <a:extLst>
                     <a:ext uri="{9D8B030D-6E8A-4147-A177-3AD203B41FA5}">
                       <a16:colId xmlns:a16="http://schemas.microsoft.com/office/drawing/2014/main" val="98828105"/>
                     </a:ext>
                   </a:extLst>
                 </a:gridCol>
-                <a:gridCol w="815788">
+                <a:gridCol w="971577">
                   <a:extLst>
                     <a:ext uri="{9D8B030D-6E8A-4147-A177-3AD203B41FA5}">
                       <a16:colId xmlns:a16="http://schemas.microsoft.com/office/drawing/2014/main" val="1652278398"/>
                     </a:ext>
                   </a:extLst>
                 </a:gridCol>
-                <a:gridCol w="708212">
+                <a:gridCol w="843460">
                   <a:extLst>
                     <a:ext uri="{9D8B030D-6E8A-4147-A177-3AD203B41FA5}">
                       <a16:colId xmlns:a16="http://schemas.microsoft.com/office/drawing/2014/main" val="3315888762"/>
                     </a:ext>
                   </a:extLst>
                 </a:gridCol>
-                <a:gridCol w="690283">
+                <a:gridCol w="822107">
                   <a:extLst>
                     <a:ext uri="{9D8B030D-6E8A-4147-A177-3AD203B41FA5}">
                       <a16:colId xmlns:a16="http://schemas.microsoft.com/office/drawing/2014/main" val="3204382854"/>
+                    </a:ext>
+                  </a:extLst>
+                </a:gridCol>
+                <a:gridCol w="822107">
+                  <a:extLst>
+                    <a:ext uri="{9D8B030D-6E8A-4147-A177-3AD203B41FA5}">
+                      <a16:colId xmlns:a16="http://schemas.microsoft.com/office/drawing/2014/main" val="94035366"/>
                     </a:ext>
                   </a:extLst>
                 </a:gridCol>
@@ -5937,6 +6143,68 @@
                   </a:tcPr>
                 </a:tc>
                 <a:tc hMerge="1">
+                  <a:txBody>
+                    <a:bodyPr/>
+                    <a:lstStyle/>
+                    <a:p>
+                      <a:endParaRPr lang="en-GB" sz="1400" dirty="0">
+                        <a:solidFill>
+                          <a:schemeClr val="tx1"/>
+                        </a:solidFill>
+                      </a:endParaRPr>
+                    </a:p>
+                  </a:txBody>
+                  <a:tcPr marL="69323" marR="69323" marT="34662" marB="34662">
+                    <a:lnL w="12700" cap="flat" cmpd="sng" algn="ctr">
+                      <a:solidFill>
+                        <a:schemeClr val="tx1"/>
+                      </a:solidFill>
+                      <a:prstDash val="solid"/>
+                      <a:round/>
+                      <a:headEnd type="none" w="med" len="med"/>
+                      <a:tailEnd type="none" w="med" len="med"/>
+                    </a:lnL>
+                    <a:lnR w="12700" cap="flat" cmpd="sng" algn="ctr">
+                      <a:solidFill>
+                        <a:schemeClr val="tx1"/>
+                      </a:solidFill>
+                      <a:prstDash val="solid"/>
+                      <a:round/>
+                      <a:headEnd type="none" w="med" len="med"/>
+                      <a:tailEnd type="none" w="med" len="med"/>
+                    </a:lnR>
+                    <a:lnT w="12700" cap="flat" cmpd="sng" algn="ctr">
+                      <a:solidFill>
+                        <a:schemeClr val="tx1"/>
+                      </a:solidFill>
+                      <a:prstDash val="solid"/>
+                      <a:round/>
+                      <a:headEnd type="none" w="med" len="med"/>
+                      <a:tailEnd type="none" w="med" len="med"/>
+                    </a:lnT>
+                    <a:lnB w="12700" cap="flat" cmpd="sng" algn="ctr">
+                      <a:solidFill>
+                        <a:schemeClr val="tx1"/>
+                      </a:solidFill>
+                      <a:prstDash val="solid"/>
+                      <a:round/>
+                      <a:headEnd type="none" w="med" len="med"/>
+                      <a:tailEnd type="none" w="med" len="med"/>
+                    </a:lnB>
+                    <a:lnTlToBr w="12700" cmpd="sng">
+                      <a:noFill/>
+                      <a:prstDash val="solid"/>
+                    </a:lnTlToBr>
+                    <a:lnBlToTr w="12700" cmpd="sng">
+                      <a:noFill/>
+                      <a:prstDash val="solid"/>
+                    </a:lnBlToTr>
+                    <a:solidFill>
+                      <a:schemeClr val="bg1"/>
+                    </a:solidFill>
+                  </a:tcPr>
+                </a:tc>
+                <a:tc>
                   <a:txBody>
                     <a:bodyPr/>
                     <a:lstStyle/>
@@ -6395,6 +6663,71 @@
                     </a:solidFill>
                   </a:tcPr>
                 </a:tc>
+                <a:tc>
+                  <a:txBody>
+                    <a:bodyPr/>
+                    <a:lstStyle/>
+                    <a:p>
+                      <a:r>
+                        <a:rPr lang="en-GB" sz="1400" dirty="0">
+                          <a:solidFill>
+                            <a:schemeClr val="tx1"/>
+                          </a:solidFill>
+                        </a:rPr>
+                        <a:t>Time</a:t>
+                      </a:r>
+                    </a:p>
+                  </a:txBody>
+                  <a:tcPr marL="69323" marR="69323" marT="34662" marB="34662">
+                    <a:lnL w="12700" cap="flat" cmpd="sng" algn="ctr">
+                      <a:solidFill>
+                        <a:schemeClr val="tx1"/>
+                      </a:solidFill>
+                      <a:prstDash val="solid"/>
+                      <a:round/>
+                      <a:headEnd type="none" w="med" len="med"/>
+                      <a:tailEnd type="none" w="med" len="med"/>
+                    </a:lnL>
+                    <a:lnR w="12700" cap="flat" cmpd="sng" algn="ctr">
+                      <a:solidFill>
+                        <a:schemeClr val="tx1"/>
+                      </a:solidFill>
+                      <a:prstDash val="solid"/>
+                      <a:round/>
+                      <a:headEnd type="none" w="med" len="med"/>
+                      <a:tailEnd type="none" w="med" len="med"/>
+                    </a:lnR>
+                    <a:lnT w="12700" cap="flat" cmpd="sng" algn="ctr">
+                      <a:solidFill>
+                        <a:schemeClr val="tx1"/>
+                      </a:solidFill>
+                      <a:prstDash val="solid"/>
+                      <a:round/>
+                      <a:headEnd type="none" w="med" len="med"/>
+                      <a:tailEnd type="none" w="med" len="med"/>
+                    </a:lnT>
+                    <a:lnB w="12700" cap="flat" cmpd="sng" algn="ctr">
+                      <a:solidFill>
+                        <a:schemeClr val="tx1"/>
+                      </a:solidFill>
+                      <a:prstDash val="solid"/>
+                      <a:round/>
+                      <a:headEnd type="none" w="med" len="med"/>
+                      <a:tailEnd type="none" w="med" len="med"/>
+                    </a:lnB>
+                    <a:lnTlToBr w="12700" cmpd="sng">
+                      <a:noFill/>
+                      <a:prstDash val="solid"/>
+                    </a:lnTlToBr>
+                    <a:lnBlToTr w="12700" cmpd="sng">
+                      <a:noFill/>
+                      <a:prstDash val="solid"/>
+                    </a:lnBlToTr>
+                    <a:solidFill>
+                      <a:schemeClr val="bg1"/>
+                    </a:solidFill>
+                  </a:tcPr>
+                </a:tc>
                 <a:extLst>
                   <a:ext uri="{0D108BD9-81ED-4DB2-BD59-A6C34878D82A}">
                     <a16:rowId xmlns:a16="http://schemas.microsoft.com/office/drawing/2014/main" val="1315690800"/>
@@ -6739,6 +7072,71 @@
                           </a:solidFill>
                         </a:rPr>
                         <a:t>int</a:t>
+                      </a:r>
+                    </a:p>
+                  </a:txBody>
+                  <a:tcPr marL="69323" marR="69323" marT="34662" marB="34662">
+                    <a:lnL w="12700" cap="flat" cmpd="sng" algn="ctr">
+                      <a:solidFill>
+                        <a:schemeClr val="tx1"/>
+                      </a:solidFill>
+                      <a:prstDash val="solid"/>
+                      <a:round/>
+                      <a:headEnd type="none" w="med" len="med"/>
+                      <a:tailEnd type="none" w="med" len="med"/>
+                    </a:lnL>
+                    <a:lnR w="12700" cap="flat" cmpd="sng" algn="ctr">
+                      <a:solidFill>
+                        <a:schemeClr val="tx1"/>
+                      </a:solidFill>
+                      <a:prstDash val="solid"/>
+                      <a:round/>
+                      <a:headEnd type="none" w="med" len="med"/>
+                      <a:tailEnd type="none" w="med" len="med"/>
+                    </a:lnR>
+                    <a:lnT w="12700" cap="flat" cmpd="sng" algn="ctr">
+                      <a:solidFill>
+                        <a:schemeClr val="tx1"/>
+                      </a:solidFill>
+                      <a:prstDash val="solid"/>
+                      <a:round/>
+                      <a:headEnd type="none" w="med" len="med"/>
+                      <a:tailEnd type="none" w="med" len="med"/>
+                    </a:lnT>
+                    <a:lnB w="12700" cap="flat" cmpd="sng" algn="ctr">
+                      <a:solidFill>
+                        <a:schemeClr val="tx1"/>
+                      </a:solidFill>
+                      <a:prstDash val="solid"/>
+                      <a:round/>
+                      <a:headEnd type="none" w="med" len="med"/>
+                      <a:tailEnd type="none" w="med" len="med"/>
+                    </a:lnB>
+                    <a:lnTlToBr w="12700" cmpd="sng">
+                      <a:noFill/>
+                      <a:prstDash val="solid"/>
+                    </a:lnTlToBr>
+                    <a:lnBlToTr w="12700" cmpd="sng">
+                      <a:noFill/>
+                      <a:prstDash val="solid"/>
+                    </a:lnBlToTr>
+                    <a:solidFill>
+                      <a:schemeClr val="bg1"/>
+                    </a:solidFill>
+                  </a:tcPr>
+                </a:tc>
+                <a:tc>
+                  <a:txBody>
+                    <a:bodyPr/>
+                    <a:lstStyle/>
+                    <a:p>
+                      <a:r>
+                        <a:rPr lang="en-GB" sz="1400" dirty="0">
+                          <a:solidFill>
+                            <a:schemeClr val="tx1"/>
+                          </a:solidFill>
+                        </a:rPr>
+                        <a:t>timestamp</a:t>
                       </a:r>
                     </a:p>
                   </a:txBody>
@@ -6982,8 +7380,8 @@
         </p:nvCxnSpPr>
         <p:spPr>
           <a:xfrm>
-            <a:off x="5155079" y="1711152"/>
-            <a:ext cx="3905250" cy="2459925"/>
+            <a:off x="6105337" y="1924512"/>
+            <a:ext cx="3585510" cy="2246565"/>
           </a:xfrm>
           <a:prstGeom prst="straightConnector1">
             <a:avLst/>

</xml_diff>

<commit_message>
Post page + minor modifications
</commit_message>
<xml_diff>
--- a/database.pptx
+++ b/database.pptx
@@ -263,7 +263,7 @@
           <a:p>
             <a:fld id="{B4E95641-670A-480D-9D2C-8853D86751B7}" type="datetimeFigureOut">
               <a:rPr lang="en-GB" smtClean="0"/>
-              <a:t>16/12/2023</a:t>
+              <a:t>18/12/2023</a:t>
             </a:fld>
             <a:endParaRPr lang="en-GB"/>
           </a:p>
@@ -463,7 +463,7 @@
           <a:p>
             <a:fld id="{B4E95641-670A-480D-9D2C-8853D86751B7}" type="datetimeFigureOut">
               <a:rPr lang="en-GB" smtClean="0"/>
-              <a:t>16/12/2023</a:t>
+              <a:t>18/12/2023</a:t>
             </a:fld>
             <a:endParaRPr lang="en-GB"/>
           </a:p>
@@ -673,7 +673,7 @@
           <a:p>
             <a:fld id="{B4E95641-670A-480D-9D2C-8853D86751B7}" type="datetimeFigureOut">
               <a:rPr lang="en-GB" smtClean="0"/>
-              <a:t>16/12/2023</a:t>
+              <a:t>18/12/2023</a:t>
             </a:fld>
             <a:endParaRPr lang="en-GB"/>
           </a:p>
@@ -873,7 +873,7 @@
           <a:p>
             <a:fld id="{B4E95641-670A-480D-9D2C-8853D86751B7}" type="datetimeFigureOut">
               <a:rPr lang="en-GB" smtClean="0"/>
-              <a:t>16/12/2023</a:t>
+              <a:t>18/12/2023</a:t>
             </a:fld>
             <a:endParaRPr lang="en-GB"/>
           </a:p>
@@ -1149,7 +1149,7 @@
           <a:p>
             <a:fld id="{B4E95641-670A-480D-9D2C-8853D86751B7}" type="datetimeFigureOut">
               <a:rPr lang="en-GB" smtClean="0"/>
-              <a:t>16/12/2023</a:t>
+              <a:t>18/12/2023</a:t>
             </a:fld>
             <a:endParaRPr lang="en-GB"/>
           </a:p>
@@ -1417,7 +1417,7 @@
           <a:p>
             <a:fld id="{B4E95641-670A-480D-9D2C-8853D86751B7}" type="datetimeFigureOut">
               <a:rPr lang="en-GB" smtClean="0"/>
-              <a:t>16/12/2023</a:t>
+              <a:t>18/12/2023</a:t>
             </a:fld>
             <a:endParaRPr lang="en-GB"/>
           </a:p>
@@ -1832,7 +1832,7 @@
           <a:p>
             <a:fld id="{B4E95641-670A-480D-9D2C-8853D86751B7}" type="datetimeFigureOut">
               <a:rPr lang="en-GB" smtClean="0"/>
-              <a:t>16/12/2023</a:t>
+              <a:t>18/12/2023</a:t>
             </a:fld>
             <a:endParaRPr lang="en-GB"/>
           </a:p>
@@ -1974,7 +1974,7 @@
           <a:p>
             <a:fld id="{B4E95641-670A-480D-9D2C-8853D86751B7}" type="datetimeFigureOut">
               <a:rPr lang="en-GB" smtClean="0"/>
-              <a:t>16/12/2023</a:t>
+              <a:t>18/12/2023</a:t>
             </a:fld>
             <a:endParaRPr lang="en-GB"/>
           </a:p>
@@ -2087,7 +2087,7 @@
           <a:p>
             <a:fld id="{B4E95641-670A-480D-9D2C-8853D86751B7}" type="datetimeFigureOut">
               <a:rPr lang="en-GB" smtClean="0"/>
-              <a:t>16/12/2023</a:t>
+              <a:t>18/12/2023</a:t>
             </a:fld>
             <a:endParaRPr lang="en-GB"/>
           </a:p>
@@ -2400,7 +2400,7 @@
           <a:p>
             <a:fld id="{B4E95641-670A-480D-9D2C-8853D86751B7}" type="datetimeFigureOut">
               <a:rPr lang="en-GB" smtClean="0"/>
-              <a:t>16/12/2023</a:t>
+              <a:t>18/12/2023</a:t>
             </a:fld>
             <a:endParaRPr lang="en-GB"/>
           </a:p>
@@ -2689,7 +2689,7 @@
           <a:p>
             <a:fld id="{B4E95641-670A-480D-9D2C-8853D86751B7}" type="datetimeFigureOut">
               <a:rPr lang="en-GB" smtClean="0"/>
-              <a:t>16/12/2023</a:t>
+              <a:t>18/12/2023</a:t>
             </a:fld>
             <a:endParaRPr lang="en-GB"/>
           </a:p>
@@ -2932,7 +2932,7 @@
           <a:p>
             <a:fld id="{B4E95641-670A-480D-9D2C-8853D86751B7}" type="datetimeFigureOut">
               <a:rPr lang="en-GB" smtClean="0"/>
-              <a:t>16/12/2023</a:t>
+              <a:t>18/12/2023</a:t>
             </a:fld>
             <a:endParaRPr lang="en-GB"/>
           </a:p>
@@ -7444,6 +7444,464 @@
           </a:fontRef>
         </p:style>
       </p:cxnSp>
+      <p:graphicFrame>
+        <p:nvGraphicFramePr>
+          <p:cNvPr id="2" name="Table 1">
+            <a:extLst>
+              <a:ext uri="{FF2B5EF4-FFF2-40B4-BE49-F238E27FC236}">
+                <a16:creationId xmlns:a16="http://schemas.microsoft.com/office/drawing/2014/main" id="{F05B1C0F-6C0B-26C2-A1B4-0903757AB146}"/>
+              </a:ext>
+            </a:extLst>
+          </p:cNvPr>
+          <p:cNvGraphicFramePr>
+            <a:graphicFrameLocks noGrp="1"/>
+          </p:cNvGraphicFramePr>
+          <p:nvPr>
+            <p:extLst>
+              <p:ext uri="{D42A27DB-BD31-4B8C-83A1-F6EECF244321}">
+                <p14:modId xmlns:p14="http://schemas.microsoft.com/office/powerpoint/2010/main" val="1321209867"/>
+              </p:ext>
+            </p:extLst>
+          </p:nvPr>
+        </p:nvGraphicFramePr>
+        <p:xfrm>
+          <a:off x="2295151" y="2545080"/>
+          <a:ext cx="2644588" cy="848052"/>
+        </p:xfrm>
+        <a:graphic>
+          <a:graphicData uri="http://schemas.openxmlformats.org/drawingml/2006/table">
+            <a:tbl>
+              <a:tblPr firstRow="1" bandRow="1">
+                <a:tableStyleId>{5C22544A-7EE6-4342-B048-85BDC9FD1C3A}</a:tableStyleId>
+              </a:tblPr>
+              <a:tblGrid>
+                <a:gridCol w="1322294">
+                  <a:extLst>
+                    <a:ext uri="{9D8B030D-6E8A-4147-A177-3AD203B41FA5}">
+                      <a16:colId xmlns:a16="http://schemas.microsoft.com/office/drawing/2014/main" val="1781345222"/>
+                    </a:ext>
+                  </a:extLst>
+                </a:gridCol>
+                <a:gridCol w="1322294">
+                  <a:extLst>
+                    <a:ext uri="{9D8B030D-6E8A-4147-A177-3AD203B41FA5}">
+                      <a16:colId xmlns:a16="http://schemas.microsoft.com/office/drawing/2014/main" val="2428297054"/>
+                    </a:ext>
+                  </a:extLst>
+                </a:gridCol>
+              </a:tblGrid>
+              <a:tr h="281143">
+                <a:tc gridSpan="2">
+                  <a:txBody>
+                    <a:bodyPr/>
+                    <a:lstStyle/>
+                    <a:p>
+                      <a:r>
+                        <a:rPr lang="en-GB" sz="1400" dirty="0">
+                          <a:solidFill>
+                            <a:schemeClr val="tx1"/>
+                          </a:solidFill>
+                        </a:rPr>
+                        <a:t>Users liking a post</a:t>
+                      </a:r>
+                    </a:p>
+                  </a:txBody>
+                  <a:tcPr marL="69323" marR="69323" marT="34662" marB="34662">
+                    <a:lnL w="12700" cap="flat" cmpd="sng" algn="ctr">
+                      <a:solidFill>
+                        <a:schemeClr val="tx1"/>
+                      </a:solidFill>
+                      <a:prstDash val="solid"/>
+                      <a:round/>
+                      <a:headEnd type="none" w="med" len="med"/>
+                      <a:tailEnd type="none" w="med" len="med"/>
+                    </a:lnL>
+                    <a:lnR w="12700" cap="flat" cmpd="sng" algn="ctr">
+                      <a:solidFill>
+                        <a:schemeClr val="tx1"/>
+                      </a:solidFill>
+                      <a:prstDash val="solid"/>
+                      <a:round/>
+                      <a:headEnd type="none" w="med" len="med"/>
+                      <a:tailEnd type="none" w="med" len="med"/>
+                    </a:lnR>
+                    <a:lnT w="12700" cap="flat" cmpd="sng" algn="ctr">
+                      <a:solidFill>
+                        <a:schemeClr val="tx1"/>
+                      </a:solidFill>
+                      <a:prstDash val="solid"/>
+                      <a:round/>
+                      <a:headEnd type="none" w="med" len="med"/>
+                      <a:tailEnd type="none" w="med" len="med"/>
+                    </a:lnT>
+                    <a:lnB w="12700" cap="flat" cmpd="sng" algn="ctr">
+                      <a:solidFill>
+                        <a:schemeClr val="tx1"/>
+                      </a:solidFill>
+                      <a:prstDash val="solid"/>
+                      <a:round/>
+                      <a:headEnd type="none" w="med" len="med"/>
+                      <a:tailEnd type="none" w="med" len="med"/>
+                    </a:lnB>
+                    <a:lnTlToBr w="12700" cmpd="sng">
+                      <a:noFill/>
+                      <a:prstDash val="solid"/>
+                    </a:lnTlToBr>
+                    <a:lnBlToTr w="12700" cmpd="sng">
+                      <a:noFill/>
+                      <a:prstDash val="solid"/>
+                    </a:lnBlToTr>
+                    <a:solidFill>
+                      <a:schemeClr val="bg1"/>
+                    </a:solidFill>
+                  </a:tcPr>
+                </a:tc>
+                <a:tc hMerge="1">
+                  <a:txBody>
+                    <a:bodyPr/>
+                    <a:lstStyle/>
+                    <a:p>
+                      <a:endParaRPr lang="en-GB" sz="1400" dirty="0">
+                        <a:solidFill>
+                          <a:schemeClr val="tx1"/>
+                        </a:solidFill>
+                      </a:endParaRPr>
+                    </a:p>
+                  </a:txBody>
+                  <a:tcPr marL="69323" marR="69323" marT="34662" marB="34662">
+                    <a:lnL w="12700" cap="flat" cmpd="sng" algn="ctr">
+                      <a:solidFill>
+                        <a:schemeClr val="tx1"/>
+                      </a:solidFill>
+                      <a:prstDash val="solid"/>
+                      <a:round/>
+                      <a:headEnd type="none" w="med" len="med"/>
+                      <a:tailEnd type="none" w="med" len="med"/>
+                    </a:lnL>
+                    <a:lnR w="12700" cap="flat" cmpd="sng" algn="ctr">
+                      <a:solidFill>
+                        <a:schemeClr val="tx1"/>
+                      </a:solidFill>
+                      <a:prstDash val="solid"/>
+                      <a:round/>
+                      <a:headEnd type="none" w="med" len="med"/>
+                      <a:tailEnd type="none" w="med" len="med"/>
+                    </a:lnR>
+                    <a:lnT w="12700" cap="flat" cmpd="sng" algn="ctr">
+                      <a:solidFill>
+                        <a:schemeClr val="tx1"/>
+                      </a:solidFill>
+                      <a:prstDash val="solid"/>
+                      <a:round/>
+                      <a:headEnd type="none" w="med" len="med"/>
+                      <a:tailEnd type="none" w="med" len="med"/>
+                    </a:lnT>
+                    <a:lnB w="12700" cap="flat" cmpd="sng" algn="ctr">
+                      <a:solidFill>
+                        <a:schemeClr val="tx1"/>
+                      </a:solidFill>
+                      <a:prstDash val="solid"/>
+                      <a:round/>
+                      <a:headEnd type="none" w="med" len="med"/>
+                      <a:tailEnd type="none" w="med" len="med"/>
+                    </a:lnB>
+                    <a:lnTlToBr w="12700" cmpd="sng">
+                      <a:noFill/>
+                      <a:prstDash val="solid"/>
+                    </a:lnTlToBr>
+                    <a:lnBlToTr w="12700" cmpd="sng">
+                      <a:noFill/>
+                      <a:prstDash val="solid"/>
+                    </a:lnBlToTr>
+                    <a:solidFill>
+                      <a:schemeClr val="bg1"/>
+                    </a:solidFill>
+                  </a:tcPr>
+                </a:tc>
+                <a:extLst>
+                  <a:ext uri="{0D108BD9-81ED-4DB2-BD59-A6C34878D82A}">
+                    <a16:rowId xmlns:a16="http://schemas.microsoft.com/office/drawing/2014/main" val="3887986916"/>
+                  </a:ext>
+                </a:extLst>
+              </a:tr>
+              <a:tr h="281143">
+                <a:tc>
+                  <a:txBody>
+                    <a:bodyPr/>
+                    <a:lstStyle/>
+                    <a:p>
+                      <a:r>
+                        <a:rPr lang="en-GB" sz="1400" dirty="0">
+                          <a:solidFill>
+                            <a:schemeClr val="tx1"/>
+                          </a:solidFill>
+                        </a:rPr>
+                        <a:t>User id</a:t>
+                      </a:r>
+                    </a:p>
+                  </a:txBody>
+                  <a:tcPr marL="69323" marR="69323" marT="34662" marB="34662">
+                    <a:lnL w="12700" cap="flat" cmpd="sng" algn="ctr">
+                      <a:solidFill>
+                        <a:schemeClr val="tx1"/>
+                      </a:solidFill>
+                      <a:prstDash val="solid"/>
+                      <a:round/>
+                      <a:headEnd type="none" w="med" len="med"/>
+                      <a:tailEnd type="none" w="med" len="med"/>
+                    </a:lnL>
+                    <a:lnR w="12700" cap="flat" cmpd="sng" algn="ctr">
+                      <a:solidFill>
+                        <a:schemeClr val="tx1"/>
+                      </a:solidFill>
+                      <a:prstDash val="solid"/>
+                      <a:round/>
+                      <a:headEnd type="none" w="med" len="med"/>
+                      <a:tailEnd type="none" w="med" len="med"/>
+                    </a:lnR>
+                    <a:lnT w="12700" cap="flat" cmpd="sng" algn="ctr">
+                      <a:solidFill>
+                        <a:schemeClr val="tx1"/>
+                      </a:solidFill>
+                      <a:prstDash val="solid"/>
+                      <a:round/>
+                      <a:headEnd type="none" w="med" len="med"/>
+                      <a:tailEnd type="none" w="med" len="med"/>
+                    </a:lnT>
+                    <a:lnB w="12700" cap="flat" cmpd="sng" algn="ctr">
+                      <a:solidFill>
+                        <a:schemeClr val="tx1"/>
+                      </a:solidFill>
+                      <a:prstDash val="solid"/>
+                      <a:round/>
+                      <a:headEnd type="none" w="med" len="med"/>
+                      <a:tailEnd type="none" w="med" len="med"/>
+                    </a:lnB>
+                    <a:lnTlToBr w="12700" cmpd="sng">
+                      <a:noFill/>
+                      <a:prstDash val="solid"/>
+                    </a:lnTlToBr>
+                    <a:lnBlToTr w="12700" cmpd="sng">
+                      <a:noFill/>
+                      <a:prstDash val="solid"/>
+                    </a:lnBlToTr>
+                    <a:solidFill>
+                      <a:schemeClr val="bg1"/>
+                    </a:solidFill>
+                  </a:tcPr>
+                </a:tc>
+                <a:tc>
+                  <a:txBody>
+                    <a:bodyPr/>
+                    <a:lstStyle/>
+                    <a:p>
+                      <a:r>
+                        <a:rPr lang="en-GB" sz="1400" dirty="0">
+                          <a:solidFill>
+                            <a:schemeClr val="tx1"/>
+                          </a:solidFill>
+                        </a:rPr>
+                        <a:t>Post id</a:t>
+                      </a:r>
+                    </a:p>
+                  </a:txBody>
+                  <a:tcPr marL="69323" marR="69323" marT="34662" marB="34662">
+                    <a:lnL w="12700" cap="flat" cmpd="sng" algn="ctr">
+                      <a:solidFill>
+                        <a:schemeClr val="tx1"/>
+                      </a:solidFill>
+                      <a:prstDash val="solid"/>
+                      <a:round/>
+                      <a:headEnd type="none" w="med" len="med"/>
+                      <a:tailEnd type="none" w="med" len="med"/>
+                    </a:lnL>
+                    <a:lnR w="12700" cap="flat" cmpd="sng" algn="ctr">
+                      <a:solidFill>
+                        <a:schemeClr val="tx1"/>
+                      </a:solidFill>
+                      <a:prstDash val="solid"/>
+                      <a:round/>
+                      <a:headEnd type="none" w="med" len="med"/>
+                      <a:tailEnd type="none" w="med" len="med"/>
+                    </a:lnR>
+                    <a:lnT w="12700" cap="flat" cmpd="sng" algn="ctr">
+                      <a:solidFill>
+                        <a:schemeClr val="tx1"/>
+                      </a:solidFill>
+                      <a:prstDash val="solid"/>
+                      <a:round/>
+                      <a:headEnd type="none" w="med" len="med"/>
+                      <a:tailEnd type="none" w="med" len="med"/>
+                    </a:lnT>
+                    <a:lnB w="12700" cap="flat" cmpd="sng" algn="ctr">
+                      <a:solidFill>
+                        <a:schemeClr val="tx1"/>
+                      </a:solidFill>
+                      <a:prstDash val="solid"/>
+                      <a:round/>
+                      <a:headEnd type="none" w="med" len="med"/>
+                      <a:tailEnd type="none" w="med" len="med"/>
+                    </a:lnB>
+                    <a:lnTlToBr w="12700" cmpd="sng">
+                      <a:noFill/>
+                      <a:prstDash val="solid"/>
+                    </a:lnTlToBr>
+                    <a:lnBlToTr w="12700" cmpd="sng">
+                      <a:noFill/>
+                      <a:prstDash val="solid"/>
+                    </a:lnBlToTr>
+                    <a:solidFill>
+                      <a:schemeClr val="bg1"/>
+                    </a:solidFill>
+                  </a:tcPr>
+                </a:tc>
+                <a:extLst>
+                  <a:ext uri="{0D108BD9-81ED-4DB2-BD59-A6C34878D82A}">
+                    <a16:rowId xmlns:a16="http://schemas.microsoft.com/office/drawing/2014/main" val="1315690800"/>
+                  </a:ext>
+                </a:extLst>
+              </a:tr>
+              <a:tr h="281143">
+                <a:tc>
+                  <a:txBody>
+                    <a:bodyPr/>
+                    <a:lstStyle/>
+                    <a:p>
+                      <a:r>
+                        <a:rPr lang="en-GB" sz="1400" dirty="0">
+                          <a:solidFill>
+                            <a:schemeClr val="tx1"/>
+                          </a:solidFill>
+                        </a:rPr>
+                        <a:t>Int NOT NULL</a:t>
+                      </a:r>
+                    </a:p>
+                  </a:txBody>
+                  <a:tcPr marL="69323" marR="69323" marT="34662" marB="34662">
+                    <a:lnL w="12700" cap="flat" cmpd="sng" algn="ctr">
+                      <a:solidFill>
+                        <a:schemeClr val="tx1"/>
+                      </a:solidFill>
+                      <a:prstDash val="solid"/>
+                      <a:round/>
+                      <a:headEnd type="none" w="med" len="med"/>
+                      <a:tailEnd type="none" w="med" len="med"/>
+                    </a:lnL>
+                    <a:lnR w="12700" cap="flat" cmpd="sng" algn="ctr">
+                      <a:solidFill>
+                        <a:schemeClr val="tx1"/>
+                      </a:solidFill>
+                      <a:prstDash val="solid"/>
+                      <a:round/>
+                      <a:headEnd type="none" w="med" len="med"/>
+                      <a:tailEnd type="none" w="med" len="med"/>
+                    </a:lnR>
+                    <a:lnT w="12700" cap="flat" cmpd="sng" algn="ctr">
+                      <a:solidFill>
+                        <a:schemeClr val="tx1"/>
+                      </a:solidFill>
+                      <a:prstDash val="solid"/>
+                      <a:round/>
+                      <a:headEnd type="none" w="med" len="med"/>
+                      <a:tailEnd type="none" w="med" len="med"/>
+                    </a:lnT>
+                    <a:lnB w="12700" cap="flat" cmpd="sng" algn="ctr">
+                      <a:solidFill>
+                        <a:schemeClr val="tx1"/>
+                      </a:solidFill>
+                      <a:prstDash val="solid"/>
+                      <a:round/>
+                      <a:headEnd type="none" w="med" len="med"/>
+                      <a:tailEnd type="none" w="med" len="med"/>
+                    </a:lnB>
+                    <a:lnTlToBr w="12700" cmpd="sng">
+                      <a:noFill/>
+                      <a:prstDash val="solid"/>
+                    </a:lnTlToBr>
+                    <a:lnBlToTr w="12700" cmpd="sng">
+                      <a:noFill/>
+                      <a:prstDash val="solid"/>
+                    </a:lnBlToTr>
+                    <a:solidFill>
+                      <a:schemeClr val="bg1"/>
+                    </a:solidFill>
+                  </a:tcPr>
+                </a:tc>
+                <a:tc>
+                  <a:txBody>
+                    <a:bodyPr/>
+                    <a:lstStyle/>
+                    <a:p>
+                      <a:r>
+                        <a:rPr lang="en-GB" sz="1400" dirty="0">
+                          <a:solidFill>
+                            <a:schemeClr val="tx1"/>
+                          </a:solidFill>
+                        </a:rPr>
+                        <a:t>Int NOT NULL</a:t>
+                      </a:r>
+                    </a:p>
+                  </a:txBody>
+                  <a:tcPr marL="69323" marR="69323" marT="34662" marB="34662">
+                    <a:lnL w="12700" cap="flat" cmpd="sng" algn="ctr">
+                      <a:solidFill>
+                        <a:schemeClr val="tx1"/>
+                      </a:solidFill>
+                      <a:prstDash val="solid"/>
+                      <a:round/>
+                      <a:headEnd type="none" w="med" len="med"/>
+                      <a:tailEnd type="none" w="med" len="med"/>
+                    </a:lnL>
+                    <a:lnR w="12700" cap="flat" cmpd="sng" algn="ctr">
+                      <a:solidFill>
+                        <a:schemeClr val="tx1"/>
+                      </a:solidFill>
+                      <a:prstDash val="solid"/>
+                      <a:round/>
+                      <a:headEnd type="none" w="med" len="med"/>
+                      <a:tailEnd type="none" w="med" len="med"/>
+                    </a:lnR>
+                    <a:lnT w="12700" cap="flat" cmpd="sng" algn="ctr">
+                      <a:solidFill>
+                        <a:schemeClr val="tx1"/>
+                      </a:solidFill>
+                      <a:prstDash val="solid"/>
+                      <a:round/>
+                      <a:headEnd type="none" w="med" len="med"/>
+                      <a:tailEnd type="none" w="med" len="med"/>
+                    </a:lnT>
+                    <a:lnB w="12700" cap="flat" cmpd="sng" algn="ctr">
+                      <a:solidFill>
+                        <a:schemeClr val="tx1"/>
+                      </a:solidFill>
+                      <a:prstDash val="solid"/>
+                      <a:round/>
+                      <a:headEnd type="none" w="med" len="med"/>
+                      <a:tailEnd type="none" w="med" len="med"/>
+                    </a:lnB>
+                    <a:lnTlToBr w="12700" cmpd="sng">
+                      <a:noFill/>
+                      <a:prstDash val="solid"/>
+                    </a:lnTlToBr>
+                    <a:lnBlToTr w="12700" cmpd="sng">
+                      <a:noFill/>
+                      <a:prstDash val="solid"/>
+                    </a:lnBlToTr>
+                    <a:solidFill>
+                      <a:schemeClr val="bg1"/>
+                    </a:solidFill>
+                  </a:tcPr>
+                </a:tc>
+                <a:extLst>
+                  <a:ext uri="{0D108BD9-81ED-4DB2-BD59-A6C34878D82A}">
+                    <a16:rowId xmlns:a16="http://schemas.microsoft.com/office/drawing/2014/main" val="713313710"/>
+                  </a:ext>
+                </a:extLst>
+              </a:tr>
+            </a:tbl>
+          </a:graphicData>
+        </a:graphic>
+      </p:graphicFrame>
     </p:spTree>
     <p:extLst>
       <p:ext uri="{BB962C8B-B14F-4D97-AF65-F5344CB8AC3E}">

</xml_diff>